<commit_message>
Add some remarks in coursework text
</commit_message>
<xml_diff>
--- a/Presentation.pptx
+++ b/Presentation.pptx
@@ -120,7 +120,7 @@
   </p:defaultTextStyle>
   <p:extLst>
     <p:ext uri="{EFAFB233-063F-42B5-8137-9DF3F51BA10A}">
-      <p15:sldGuideLst xmlns:p15="http://schemas.microsoft.com/office/powerpoint/2012/main" xmlns="">
+      <p15:sldGuideLst xmlns="" xmlns:p15="http://schemas.microsoft.com/office/powerpoint/2012/main">
         <p15:guide id="2" pos="325" userDrawn="1">
           <p15:clr>
             <a:srgbClr val="A4A3A4"/>
@@ -179,7 +179,7 @@
       </p15:sldGuideLst>
     </p:ext>
     <p:ext uri="{2D200454-40CA-4A62-9FC3-DE9A4176ACB9}">
-      <p15:notesGuideLst xmlns:p15="http://schemas.microsoft.com/office/powerpoint/2012/main" xmlns="">
+      <p15:notesGuideLst xmlns="" xmlns:p15="http://schemas.microsoft.com/office/powerpoint/2012/main">
         <p15:guide id="1" orient="horz" pos="2880" userDrawn="1">
           <p15:clr>
             <a:srgbClr val="A4A3A4"/>
@@ -560,11 +560,11 @@
           <c:showBubbleSize val="0"/>
         </c:dLbls>
         <c:gapWidth val="182"/>
-        <c:axId val="213564416"/>
-        <c:axId val="221381376"/>
+        <c:axId val="134499328"/>
+        <c:axId val="134505216"/>
       </c:barChart>
       <c:catAx>
-        <c:axId val="213564416"/>
+        <c:axId val="134499328"/>
         <c:scaling>
           <c:orientation val="minMax"/>
         </c:scaling>
@@ -604,7 +604,7 @@
             <a:endParaRPr lang="ru-RU"/>
           </a:p>
         </c:txPr>
-        <c:crossAx val="221381376"/>
+        <c:crossAx val="134505216"/>
         <c:crosses val="autoZero"/>
         <c:auto val="1"/>
         <c:lblAlgn val="ctr"/>
@@ -612,7 +612,7 @@
         <c:noMultiLvlLbl val="0"/>
       </c:catAx>
       <c:valAx>
-        <c:axId val="221381376"/>
+        <c:axId val="134505216"/>
         <c:scaling>
           <c:orientation val="minMax"/>
         </c:scaling>
@@ -660,7 +660,7 @@
             <a:endParaRPr lang="ru-RU"/>
           </a:p>
         </c:txPr>
-        <c:crossAx val="213564416"/>
+        <c:crossAx val="134499328"/>
         <c:crosses val="autoZero"/>
         <c:crossBetween val="between"/>
       </c:valAx>
@@ -1308,11 +1308,11 @@
           <c:showBubbleSize val="0"/>
         </c:dLbls>
         <c:gapWidth val="182"/>
-        <c:axId val="263452160"/>
-        <c:axId val="263453696"/>
+        <c:axId val="133797376"/>
+        <c:axId val="133798912"/>
       </c:barChart>
       <c:catAx>
-        <c:axId val="263452160"/>
+        <c:axId val="133797376"/>
         <c:scaling>
           <c:orientation val="minMax"/>
         </c:scaling>
@@ -1352,7 +1352,7 @@
             <a:endParaRPr lang="ru-RU"/>
           </a:p>
         </c:txPr>
-        <c:crossAx val="263453696"/>
+        <c:crossAx val="133798912"/>
         <c:crosses val="autoZero"/>
         <c:auto val="1"/>
         <c:lblAlgn val="ctr"/>
@@ -1360,7 +1360,7 @@
         <c:noMultiLvlLbl val="0"/>
       </c:catAx>
       <c:valAx>
-        <c:axId val="263453696"/>
+        <c:axId val="133798912"/>
         <c:scaling>
           <c:orientation val="minMax"/>
         </c:scaling>
@@ -1408,7 +1408,7 @@
             <a:endParaRPr lang="ru-RU"/>
           </a:p>
         </c:txPr>
-        <c:crossAx val="263452160"/>
+        <c:crossAx val="133797376"/>
         <c:crosses val="autoZero"/>
         <c:crossBetween val="between"/>
       </c:valAx>
@@ -2589,7 +2589,7 @@
           <a:p>
             <a:fld id="{73261BF4-8B2C-784B-9959-B59A059012C3}" type="datetimeFigureOut">
               <a:rPr lang="x-none" smtClean="0"/>
-              <a:t>13.02.2022</a:t>
+              <a:t>14.02.2022</a:t>
             </a:fld>
             <a:endParaRPr lang="x-none"/>
           </a:p>
@@ -2893,7 +2893,7 @@
           <p:cNvPr id="7" name="Picture 28" descr="A blue circle with white text&#10;&#10;Description automatically generated with low confidence">
             <a:extLst>
               <a:ext uri="{FF2B5EF4-FFF2-40B4-BE49-F238E27FC236}">
-                <a16:creationId xmlns:a16="http://schemas.microsoft.com/office/drawing/2014/main" xmlns="" id="{BA292C80-0DA8-194A-9A66-279048FA2A54}"/>
+                <a16:creationId xmlns="" xmlns:a16="http://schemas.microsoft.com/office/drawing/2014/main" id="{BA292C80-0DA8-194A-9A66-279048FA2A54}"/>
               </a:ext>
             </a:extLst>
           </p:cNvPr>
@@ -2923,7 +2923,7 @@
           <p:cNvPr id="11" name="Straight Connector 48">
             <a:extLst>
               <a:ext uri="{FF2B5EF4-FFF2-40B4-BE49-F238E27FC236}">
-                <a16:creationId xmlns:a16="http://schemas.microsoft.com/office/drawing/2014/main" xmlns="" id="{313EF906-5BAC-0141-A198-076E155DF9E2}"/>
+                <a16:creationId xmlns="" xmlns:a16="http://schemas.microsoft.com/office/drawing/2014/main" id="{313EF906-5BAC-0141-A198-076E155DF9E2}"/>
               </a:ext>
             </a:extLst>
           </p:cNvPr>
@@ -2966,7 +2966,7 @@
           <p:cNvPr id="12" name="Straight Connector 50">
             <a:extLst>
               <a:ext uri="{FF2B5EF4-FFF2-40B4-BE49-F238E27FC236}">
-                <a16:creationId xmlns:a16="http://schemas.microsoft.com/office/drawing/2014/main" xmlns="" id="{61206A97-26F2-E646-8775-9928FEF465B5}"/>
+                <a16:creationId xmlns="" xmlns:a16="http://schemas.microsoft.com/office/drawing/2014/main" id="{61206A97-26F2-E646-8775-9928FEF465B5}"/>
               </a:ext>
             </a:extLst>
           </p:cNvPr>
@@ -3009,7 +3009,7 @@
           <p:cNvPr id="13" name="Straight Connector 51">
             <a:extLst>
               <a:ext uri="{FF2B5EF4-FFF2-40B4-BE49-F238E27FC236}">
-                <a16:creationId xmlns:a16="http://schemas.microsoft.com/office/drawing/2014/main" xmlns="" id="{28E0E5F6-C1CA-9B41-B1DB-6E4FB509084D}"/>
+                <a16:creationId xmlns="" xmlns:a16="http://schemas.microsoft.com/office/drawing/2014/main" id="{28E0E5F6-C1CA-9B41-B1DB-6E4FB509084D}"/>
               </a:ext>
             </a:extLst>
           </p:cNvPr>
@@ -3052,7 +3052,7 @@
           <p:cNvPr id="16" name="Заголовок 15">
             <a:extLst>
               <a:ext uri="{FF2B5EF4-FFF2-40B4-BE49-F238E27FC236}">
-                <a16:creationId xmlns:a16="http://schemas.microsoft.com/office/drawing/2014/main" xmlns="" id="{6007C52F-2E27-E24A-B9DC-AAAB052DBD59}"/>
+                <a16:creationId xmlns="" xmlns:a16="http://schemas.microsoft.com/office/drawing/2014/main" id="{6007C52F-2E27-E24A-B9DC-AAAB052DBD59}"/>
               </a:ext>
             </a:extLst>
           </p:cNvPr>
@@ -3140,7 +3140,7 @@
           <p:cNvPr id="20" name="Текст 19">
             <a:extLst>
               <a:ext uri="{FF2B5EF4-FFF2-40B4-BE49-F238E27FC236}">
-                <a16:creationId xmlns:a16="http://schemas.microsoft.com/office/drawing/2014/main" xmlns="" id="{18109844-C2E7-354F-9C01-8834E4DCE373}"/>
+                <a16:creationId xmlns="" xmlns:a16="http://schemas.microsoft.com/office/drawing/2014/main" id="{18109844-C2E7-354F-9C01-8834E4DCE373}"/>
               </a:ext>
             </a:extLst>
           </p:cNvPr>
@@ -3232,7 +3232,7 @@
           <p:cNvPr id="25" name="Текст 24">
             <a:extLst>
               <a:ext uri="{FF2B5EF4-FFF2-40B4-BE49-F238E27FC236}">
-                <a16:creationId xmlns:a16="http://schemas.microsoft.com/office/drawing/2014/main" xmlns="" id="{40A04329-C800-BB42-BFE0-7E3C68848DA7}"/>
+                <a16:creationId xmlns="" xmlns:a16="http://schemas.microsoft.com/office/drawing/2014/main" id="{40A04329-C800-BB42-BFE0-7E3C68848DA7}"/>
               </a:ext>
             </a:extLst>
           </p:cNvPr>
@@ -3310,7 +3310,7 @@
           <p:cNvPr id="27" name="Текст 26">
             <a:extLst>
               <a:ext uri="{FF2B5EF4-FFF2-40B4-BE49-F238E27FC236}">
-                <a16:creationId xmlns:a16="http://schemas.microsoft.com/office/drawing/2014/main" xmlns="" id="{98337931-3EC2-F348-99EA-860F4FFDC188}"/>
+                <a16:creationId xmlns="" xmlns:a16="http://schemas.microsoft.com/office/drawing/2014/main" id="{98337931-3EC2-F348-99EA-860F4FFDC188}"/>
               </a:ext>
             </a:extLst>
           </p:cNvPr>
@@ -3411,7 +3411,7 @@
           <p:cNvPr id="29" name="Текст 28">
             <a:extLst>
               <a:ext uri="{FF2B5EF4-FFF2-40B4-BE49-F238E27FC236}">
-                <a16:creationId xmlns:a16="http://schemas.microsoft.com/office/drawing/2014/main" xmlns="" id="{EEA7A79B-D410-B44F-BF32-C3EAEFC20A6E}"/>
+                <a16:creationId xmlns="" xmlns:a16="http://schemas.microsoft.com/office/drawing/2014/main" id="{EEA7A79B-D410-B44F-BF32-C3EAEFC20A6E}"/>
               </a:ext>
             </a:extLst>
           </p:cNvPr>
@@ -3496,7 +3496,7 @@
   </p:clrMapOvr>
   <p:extLst>
     <p:ext uri="{DCECCB84-F9BA-43D5-87BE-67443E8EF086}">
-      <p15:sldGuideLst xmlns:p15="http://schemas.microsoft.com/office/powerpoint/2012/main" xmlns=""/>
+      <p15:sldGuideLst xmlns="" xmlns:p15="http://schemas.microsoft.com/office/powerpoint/2012/main"/>
     </p:ext>
   </p:extLst>
 </p:sldLayout>
@@ -3538,7 +3538,7 @@
           <p:cNvPr id="7" name="Picture 4" descr="Icon&#10;&#10;Description automatically generated">
             <a:extLst>
               <a:ext uri="{FF2B5EF4-FFF2-40B4-BE49-F238E27FC236}">
-                <a16:creationId xmlns:a16="http://schemas.microsoft.com/office/drawing/2014/main" xmlns="" id="{9328428E-0D3D-6E4B-BAC0-3F63BAF7DB74}"/>
+                <a16:creationId xmlns="" xmlns:a16="http://schemas.microsoft.com/office/drawing/2014/main" id="{9328428E-0D3D-6E4B-BAC0-3F63BAF7DB74}"/>
               </a:ext>
             </a:extLst>
           </p:cNvPr>
@@ -3568,7 +3568,7 @@
           <p:cNvPr id="8" name="Straight Connector 19">
             <a:extLst>
               <a:ext uri="{FF2B5EF4-FFF2-40B4-BE49-F238E27FC236}">
-                <a16:creationId xmlns:a16="http://schemas.microsoft.com/office/drawing/2014/main" xmlns="" id="{86CF47C6-D972-9E44-A717-6848F3489399}"/>
+                <a16:creationId xmlns="" xmlns:a16="http://schemas.microsoft.com/office/drawing/2014/main" id="{86CF47C6-D972-9E44-A717-6848F3489399}"/>
               </a:ext>
             </a:extLst>
           </p:cNvPr>
@@ -3611,7 +3611,7 @@
           <p:cNvPr id="9" name="Straight Connector 21">
             <a:extLst>
               <a:ext uri="{FF2B5EF4-FFF2-40B4-BE49-F238E27FC236}">
-                <a16:creationId xmlns:a16="http://schemas.microsoft.com/office/drawing/2014/main" xmlns="" id="{412FEF63-77C0-7C4A-B9BE-4BC0EEEEB78C}"/>
+                <a16:creationId xmlns="" xmlns:a16="http://schemas.microsoft.com/office/drawing/2014/main" id="{412FEF63-77C0-7C4A-B9BE-4BC0EEEEB78C}"/>
               </a:ext>
             </a:extLst>
           </p:cNvPr>
@@ -3654,7 +3654,7 @@
           <p:cNvPr id="10" name="Straight Connector 25">
             <a:extLst>
               <a:ext uri="{FF2B5EF4-FFF2-40B4-BE49-F238E27FC236}">
-                <a16:creationId xmlns:a16="http://schemas.microsoft.com/office/drawing/2014/main" xmlns="" id="{C4F550E9-E979-284D-B65F-44E092DD9D02}"/>
+                <a16:creationId xmlns="" xmlns:a16="http://schemas.microsoft.com/office/drawing/2014/main" id="{C4F550E9-E979-284D-B65F-44E092DD9D02}"/>
               </a:ext>
             </a:extLst>
           </p:cNvPr>
@@ -3697,7 +3697,7 @@
           <p:cNvPr id="11" name="TextBox 10">
             <a:extLst>
               <a:ext uri="{FF2B5EF4-FFF2-40B4-BE49-F238E27FC236}">
-                <a16:creationId xmlns:a16="http://schemas.microsoft.com/office/drawing/2014/main" xmlns="" id="{3A39D099-B515-F343-BF7A-A95468DA3860}"/>
+                <a16:creationId xmlns="" xmlns:a16="http://schemas.microsoft.com/office/drawing/2014/main" id="{3A39D099-B515-F343-BF7A-A95468DA3860}"/>
               </a:ext>
             </a:extLst>
           </p:cNvPr>
@@ -3743,7 +3743,7 @@
           <p:cNvPr id="12" name="Straight Connector 59">
             <a:extLst>
               <a:ext uri="{FF2B5EF4-FFF2-40B4-BE49-F238E27FC236}">
-                <a16:creationId xmlns:a16="http://schemas.microsoft.com/office/drawing/2014/main" xmlns="" id="{396B1F99-9711-C64F-A7C9-4F1D89E7F11D}"/>
+                <a16:creationId xmlns="" xmlns:a16="http://schemas.microsoft.com/office/drawing/2014/main" id="{396B1F99-9711-C64F-A7C9-4F1D89E7F11D}"/>
               </a:ext>
             </a:extLst>
           </p:cNvPr>
@@ -3786,7 +3786,7 @@
           <p:cNvPr id="19" name="Заголовок 31">
             <a:extLst>
               <a:ext uri="{FF2B5EF4-FFF2-40B4-BE49-F238E27FC236}">
-                <a16:creationId xmlns:a16="http://schemas.microsoft.com/office/drawing/2014/main" xmlns="" id="{1C20890C-BC1C-0745-9AF3-46700BA27C4A}"/>
+                <a16:creationId xmlns="" xmlns:a16="http://schemas.microsoft.com/office/drawing/2014/main" id="{1C20890C-BC1C-0745-9AF3-46700BA27C4A}"/>
               </a:ext>
             </a:extLst>
           </p:cNvPr>
@@ -3862,7 +3862,7 @@
           <p:cNvPr id="20" name="Текст 35">
             <a:extLst>
               <a:ext uri="{FF2B5EF4-FFF2-40B4-BE49-F238E27FC236}">
-                <a16:creationId xmlns:a16="http://schemas.microsoft.com/office/drawing/2014/main" xmlns="" id="{CA2589F7-4500-024F-8E07-D726629A599C}"/>
+                <a16:creationId xmlns="" xmlns:a16="http://schemas.microsoft.com/office/drawing/2014/main" id="{CA2589F7-4500-024F-8E07-D726629A599C}"/>
               </a:ext>
             </a:extLst>
           </p:cNvPr>
@@ -4028,7 +4028,7 @@
           <p:cNvPr id="21" name="Oval 5">
             <a:extLst>
               <a:ext uri="{FF2B5EF4-FFF2-40B4-BE49-F238E27FC236}">
-                <a16:creationId xmlns:a16="http://schemas.microsoft.com/office/drawing/2014/main" xmlns="" id="{D2CA403A-98E7-6C42-8F44-30AB6622C802}"/>
+                <a16:creationId xmlns="" xmlns:a16="http://schemas.microsoft.com/office/drawing/2014/main" id="{D2CA403A-98E7-6C42-8F44-30AB6622C802}"/>
               </a:ext>
             </a:extLst>
           </p:cNvPr>
@@ -4080,7 +4080,7 @@
           <p:cNvPr id="22" name="Oval 20">
             <a:extLst>
               <a:ext uri="{FF2B5EF4-FFF2-40B4-BE49-F238E27FC236}">
-                <a16:creationId xmlns:a16="http://schemas.microsoft.com/office/drawing/2014/main" xmlns="" id="{42ABAA5D-E7AB-6E48-9D43-A48178C9BDD4}"/>
+                <a16:creationId xmlns="" xmlns:a16="http://schemas.microsoft.com/office/drawing/2014/main" id="{42ABAA5D-E7AB-6E48-9D43-A48178C9BDD4}"/>
               </a:ext>
             </a:extLst>
           </p:cNvPr>
@@ -4132,7 +4132,7 @@
           <p:cNvPr id="23" name="Oval 22">
             <a:extLst>
               <a:ext uri="{FF2B5EF4-FFF2-40B4-BE49-F238E27FC236}">
-                <a16:creationId xmlns:a16="http://schemas.microsoft.com/office/drawing/2014/main" xmlns="" id="{209F185A-8F67-9C42-A7C5-87E483F4FC19}"/>
+                <a16:creationId xmlns="" xmlns:a16="http://schemas.microsoft.com/office/drawing/2014/main" id="{209F185A-8F67-9C42-A7C5-87E483F4FC19}"/>
               </a:ext>
             </a:extLst>
           </p:cNvPr>
@@ -4184,7 +4184,7 @@
           <p:cNvPr id="24" name="Oval 23">
             <a:extLst>
               <a:ext uri="{FF2B5EF4-FFF2-40B4-BE49-F238E27FC236}">
-                <a16:creationId xmlns:a16="http://schemas.microsoft.com/office/drawing/2014/main" xmlns="" id="{279AE0F6-4E37-6C4D-AF45-824EEE489A15}"/>
+                <a16:creationId xmlns="" xmlns:a16="http://schemas.microsoft.com/office/drawing/2014/main" id="{279AE0F6-4E37-6C4D-AF45-824EEE489A15}"/>
               </a:ext>
             </a:extLst>
           </p:cNvPr>
@@ -4236,7 +4236,7 @@
           <p:cNvPr id="25" name="Oval 26">
             <a:extLst>
               <a:ext uri="{FF2B5EF4-FFF2-40B4-BE49-F238E27FC236}">
-                <a16:creationId xmlns:a16="http://schemas.microsoft.com/office/drawing/2014/main" xmlns="" id="{330C0EA4-7FD1-CE4D-AC95-8C484C5AC790}"/>
+                <a16:creationId xmlns="" xmlns:a16="http://schemas.microsoft.com/office/drawing/2014/main" id="{330C0EA4-7FD1-CE4D-AC95-8C484C5AC790}"/>
               </a:ext>
             </a:extLst>
           </p:cNvPr>
@@ -4288,7 +4288,7 @@
           <p:cNvPr id="26" name="Oval 29">
             <a:extLst>
               <a:ext uri="{FF2B5EF4-FFF2-40B4-BE49-F238E27FC236}">
-                <a16:creationId xmlns:a16="http://schemas.microsoft.com/office/drawing/2014/main" xmlns="" id="{4C53CF3D-7EFB-DF4F-8EA6-5644574E9AFB}"/>
+                <a16:creationId xmlns="" xmlns:a16="http://schemas.microsoft.com/office/drawing/2014/main" id="{4C53CF3D-7EFB-DF4F-8EA6-5644574E9AFB}"/>
               </a:ext>
             </a:extLst>
           </p:cNvPr>
@@ -4340,7 +4340,7 @@
           <p:cNvPr id="27" name="Oval 33">
             <a:extLst>
               <a:ext uri="{FF2B5EF4-FFF2-40B4-BE49-F238E27FC236}">
-                <a16:creationId xmlns:a16="http://schemas.microsoft.com/office/drawing/2014/main" xmlns="" id="{B42CE88A-E9A3-2A4E-BD50-EB37311F39EC}"/>
+                <a16:creationId xmlns="" xmlns:a16="http://schemas.microsoft.com/office/drawing/2014/main" id="{B42CE88A-E9A3-2A4E-BD50-EB37311F39EC}"/>
               </a:ext>
             </a:extLst>
           </p:cNvPr>
@@ -4392,7 +4392,7 @@
           <p:cNvPr id="28" name="Oval 34">
             <a:extLst>
               <a:ext uri="{FF2B5EF4-FFF2-40B4-BE49-F238E27FC236}">
-                <a16:creationId xmlns:a16="http://schemas.microsoft.com/office/drawing/2014/main" xmlns="" id="{B699EFDF-DB9D-3C4F-9D1F-461508017BDA}"/>
+                <a16:creationId xmlns="" xmlns:a16="http://schemas.microsoft.com/office/drawing/2014/main" id="{B699EFDF-DB9D-3C4F-9D1F-461508017BDA}"/>
               </a:ext>
             </a:extLst>
           </p:cNvPr>
@@ -4444,7 +4444,7 @@
           <p:cNvPr id="29" name="Oval 35">
             <a:extLst>
               <a:ext uri="{FF2B5EF4-FFF2-40B4-BE49-F238E27FC236}">
-                <a16:creationId xmlns:a16="http://schemas.microsoft.com/office/drawing/2014/main" xmlns="" id="{5DF3131C-EEA1-5446-B567-C9DA0A2A1AFF}"/>
+                <a16:creationId xmlns="" xmlns:a16="http://schemas.microsoft.com/office/drawing/2014/main" id="{5DF3131C-EEA1-5446-B567-C9DA0A2A1AFF}"/>
               </a:ext>
             </a:extLst>
           </p:cNvPr>
@@ -4496,7 +4496,7 @@
           <p:cNvPr id="30" name="Oval 36">
             <a:extLst>
               <a:ext uri="{FF2B5EF4-FFF2-40B4-BE49-F238E27FC236}">
-                <a16:creationId xmlns:a16="http://schemas.microsoft.com/office/drawing/2014/main" xmlns="" id="{6D03B317-B61D-2945-8C0A-A6EBD87ACD07}"/>
+                <a16:creationId xmlns="" xmlns:a16="http://schemas.microsoft.com/office/drawing/2014/main" id="{6D03B317-B61D-2945-8C0A-A6EBD87ACD07}"/>
               </a:ext>
             </a:extLst>
           </p:cNvPr>
@@ -4548,7 +4548,7 @@
           <p:cNvPr id="31" name="Oval 37">
             <a:extLst>
               <a:ext uri="{FF2B5EF4-FFF2-40B4-BE49-F238E27FC236}">
-                <a16:creationId xmlns:a16="http://schemas.microsoft.com/office/drawing/2014/main" xmlns="" id="{9C0266F1-C0B7-624A-A873-5F2C8801E766}"/>
+                <a16:creationId xmlns="" xmlns:a16="http://schemas.microsoft.com/office/drawing/2014/main" id="{9C0266F1-C0B7-624A-A873-5F2C8801E766}"/>
               </a:ext>
             </a:extLst>
           </p:cNvPr>
@@ -4600,7 +4600,7 @@
           <p:cNvPr id="32" name="Oval 38">
             <a:extLst>
               <a:ext uri="{FF2B5EF4-FFF2-40B4-BE49-F238E27FC236}">
-                <a16:creationId xmlns:a16="http://schemas.microsoft.com/office/drawing/2014/main" xmlns="" id="{30C0C10E-388C-9843-8270-19D471BD3756}"/>
+                <a16:creationId xmlns="" xmlns:a16="http://schemas.microsoft.com/office/drawing/2014/main" id="{30C0C10E-388C-9843-8270-19D471BD3756}"/>
               </a:ext>
             </a:extLst>
           </p:cNvPr>
@@ -4652,7 +4652,7 @@
           <p:cNvPr id="33" name="Oval 39">
             <a:extLst>
               <a:ext uri="{FF2B5EF4-FFF2-40B4-BE49-F238E27FC236}">
-                <a16:creationId xmlns:a16="http://schemas.microsoft.com/office/drawing/2014/main" xmlns="" id="{87047EA3-79D2-8644-A568-E64AA1D7D370}"/>
+                <a16:creationId xmlns="" xmlns:a16="http://schemas.microsoft.com/office/drawing/2014/main" id="{87047EA3-79D2-8644-A568-E64AA1D7D370}"/>
               </a:ext>
             </a:extLst>
           </p:cNvPr>
@@ -4704,7 +4704,7 @@
           <p:cNvPr id="34" name="Oval 40">
             <a:extLst>
               <a:ext uri="{FF2B5EF4-FFF2-40B4-BE49-F238E27FC236}">
-                <a16:creationId xmlns:a16="http://schemas.microsoft.com/office/drawing/2014/main" xmlns="" id="{7F5D1C6B-4E6B-0346-A5DC-C511DB14EFD6}"/>
+                <a16:creationId xmlns="" xmlns:a16="http://schemas.microsoft.com/office/drawing/2014/main" id="{7F5D1C6B-4E6B-0346-A5DC-C511DB14EFD6}"/>
               </a:ext>
             </a:extLst>
           </p:cNvPr>
@@ -4756,7 +4756,7 @@
           <p:cNvPr id="35" name="Oval 41">
             <a:extLst>
               <a:ext uri="{FF2B5EF4-FFF2-40B4-BE49-F238E27FC236}">
-                <a16:creationId xmlns:a16="http://schemas.microsoft.com/office/drawing/2014/main" xmlns="" id="{EB421DBA-35DE-2C4F-A89E-27F0998EF4E8}"/>
+                <a16:creationId xmlns="" xmlns:a16="http://schemas.microsoft.com/office/drawing/2014/main" id="{EB421DBA-35DE-2C4F-A89E-27F0998EF4E8}"/>
               </a:ext>
             </a:extLst>
           </p:cNvPr>
@@ -4808,7 +4808,7 @@
           <p:cNvPr id="36" name="Oval 42">
             <a:extLst>
               <a:ext uri="{FF2B5EF4-FFF2-40B4-BE49-F238E27FC236}">
-                <a16:creationId xmlns:a16="http://schemas.microsoft.com/office/drawing/2014/main" xmlns="" id="{081BD842-A9A1-5B44-81ED-A97BA390032B}"/>
+                <a16:creationId xmlns="" xmlns:a16="http://schemas.microsoft.com/office/drawing/2014/main" id="{081BD842-A9A1-5B44-81ED-A97BA390032B}"/>
               </a:ext>
             </a:extLst>
           </p:cNvPr>
@@ -4860,7 +4860,7 @@
           <p:cNvPr id="37" name="Oval 43">
             <a:extLst>
               <a:ext uri="{FF2B5EF4-FFF2-40B4-BE49-F238E27FC236}">
-                <a16:creationId xmlns:a16="http://schemas.microsoft.com/office/drawing/2014/main" xmlns="" id="{036EE7D2-A33A-434C-B272-C82E2CDD4D4D}"/>
+                <a16:creationId xmlns="" xmlns:a16="http://schemas.microsoft.com/office/drawing/2014/main" id="{036EE7D2-A33A-434C-B272-C82E2CDD4D4D}"/>
               </a:ext>
             </a:extLst>
           </p:cNvPr>
@@ -4912,7 +4912,7 @@
           <p:cNvPr id="38" name="Oval 44">
             <a:extLst>
               <a:ext uri="{FF2B5EF4-FFF2-40B4-BE49-F238E27FC236}">
-                <a16:creationId xmlns:a16="http://schemas.microsoft.com/office/drawing/2014/main" xmlns="" id="{7DD65DA4-F076-C242-813E-8C17DCABCCFB}"/>
+                <a16:creationId xmlns="" xmlns:a16="http://schemas.microsoft.com/office/drawing/2014/main" id="{7DD65DA4-F076-C242-813E-8C17DCABCCFB}"/>
               </a:ext>
             </a:extLst>
           </p:cNvPr>
@@ -4964,7 +4964,7 @@
           <p:cNvPr id="39" name="Oval 45">
             <a:extLst>
               <a:ext uri="{FF2B5EF4-FFF2-40B4-BE49-F238E27FC236}">
-                <a16:creationId xmlns:a16="http://schemas.microsoft.com/office/drawing/2014/main" xmlns="" id="{8A44D99D-BF66-2848-B460-F59D8ECF5690}"/>
+                <a16:creationId xmlns="" xmlns:a16="http://schemas.microsoft.com/office/drawing/2014/main" id="{8A44D99D-BF66-2848-B460-F59D8ECF5690}"/>
               </a:ext>
             </a:extLst>
           </p:cNvPr>
@@ -5016,7 +5016,7 @@
           <p:cNvPr id="40" name="Oval 46">
             <a:extLst>
               <a:ext uri="{FF2B5EF4-FFF2-40B4-BE49-F238E27FC236}">
-                <a16:creationId xmlns:a16="http://schemas.microsoft.com/office/drawing/2014/main" xmlns="" id="{9B130CEB-3D74-B647-BA6B-32F7D70FD354}"/>
+                <a16:creationId xmlns="" xmlns:a16="http://schemas.microsoft.com/office/drawing/2014/main" id="{9B130CEB-3D74-B647-BA6B-32F7D70FD354}"/>
               </a:ext>
             </a:extLst>
           </p:cNvPr>
@@ -5068,7 +5068,7 @@
           <p:cNvPr id="41" name="Текст 37">
             <a:extLst>
               <a:ext uri="{FF2B5EF4-FFF2-40B4-BE49-F238E27FC236}">
-                <a16:creationId xmlns:a16="http://schemas.microsoft.com/office/drawing/2014/main" xmlns="" id="{800F6957-CEFF-924E-B258-5B51A5196DEB}"/>
+                <a16:creationId xmlns="" xmlns:a16="http://schemas.microsoft.com/office/drawing/2014/main" id="{800F6957-CEFF-924E-B258-5B51A5196DEB}"/>
               </a:ext>
             </a:extLst>
           </p:cNvPr>
@@ -5185,7 +5185,7 @@
           <p:cNvPr id="42" name="Текст 39">
             <a:extLst>
               <a:ext uri="{FF2B5EF4-FFF2-40B4-BE49-F238E27FC236}">
-                <a16:creationId xmlns:a16="http://schemas.microsoft.com/office/drawing/2014/main" xmlns="" id="{8FD4982C-EBD6-6D4D-A16B-212CB048938C}"/>
+                <a16:creationId xmlns="" xmlns:a16="http://schemas.microsoft.com/office/drawing/2014/main" id="{8FD4982C-EBD6-6D4D-A16B-212CB048938C}"/>
               </a:ext>
             </a:extLst>
           </p:cNvPr>
@@ -5292,7 +5292,7 @@
           <p:cNvPr id="43" name="Текст 39">
             <a:extLst>
               <a:ext uri="{FF2B5EF4-FFF2-40B4-BE49-F238E27FC236}">
-                <a16:creationId xmlns:a16="http://schemas.microsoft.com/office/drawing/2014/main" xmlns="" id="{733D5CDE-163B-C148-A20F-A808E0652336}"/>
+                <a16:creationId xmlns="" xmlns:a16="http://schemas.microsoft.com/office/drawing/2014/main" id="{733D5CDE-163B-C148-A20F-A808E0652336}"/>
               </a:ext>
             </a:extLst>
           </p:cNvPr>
@@ -5443,7 +5443,7 @@
           <p:cNvPr id="8" name="Picture 4" descr="Icon&#10;&#10;Description automatically generated">
             <a:extLst>
               <a:ext uri="{FF2B5EF4-FFF2-40B4-BE49-F238E27FC236}">
-                <a16:creationId xmlns:a16="http://schemas.microsoft.com/office/drawing/2014/main" xmlns="" id="{A7FA04E4-3213-8F41-B068-4DC281441422}"/>
+                <a16:creationId xmlns="" xmlns:a16="http://schemas.microsoft.com/office/drawing/2014/main" id="{A7FA04E4-3213-8F41-B068-4DC281441422}"/>
               </a:ext>
             </a:extLst>
           </p:cNvPr>
@@ -5473,7 +5473,7 @@
           <p:cNvPr id="9" name="Straight Connector 19">
             <a:extLst>
               <a:ext uri="{FF2B5EF4-FFF2-40B4-BE49-F238E27FC236}">
-                <a16:creationId xmlns:a16="http://schemas.microsoft.com/office/drawing/2014/main" xmlns="" id="{938052A0-3DF0-DC47-B7E0-C20EF981C230}"/>
+                <a16:creationId xmlns="" xmlns:a16="http://schemas.microsoft.com/office/drawing/2014/main" id="{938052A0-3DF0-DC47-B7E0-C20EF981C230}"/>
               </a:ext>
             </a:extLst>
           </p:cNvPr>
@@ -5516,7 +5516,7 @@
           <p:cNvPr id="10" name="Straight Connector 21">
             <a:extLst>
               <a:ext uri="{FF2B5EF4-FFF2-40B4-BE49-F238E27FC236}">
-                <a16:creationId xmlns:a16="http://schemas.microsoft.com/office/drawing/2014/main" xmlns="" id="{8C6147F0-3CA1-264C-B2B2-F88597196943}"/>
+                <a16:creationId xmlns="" xmlns:a16="http://schemas.microsoft.com/office/drawing/2014/main" id="{8C6147F0-3CA1-264C-B2B2-F88597196943}"/>
               </a:ext>
             </a:extLst>
           </p:cNvPr>
@@ -5559,7 +5559,7 @@
           <p:cNvPr id="11" name="Straight Connector 25">
             <a:extLst>
               <a:ext uri="{FF2B5EF4-FFF2-40B4-BE49-F238E27FC236}">
-                <a16:creationId xmlns:a16="http://schemas.microsoft.com/office/drawing/2014/main" xmlns="" id="{62CDF50E-4D58-AF4A-ABFD-140AF88B3681}"/>
+                <a16:creationId xmlns="" xmlns:a16="http://schemas.microsoft.com/office/drawing/2014/main" id="{62CDF50E-4D58-AF4A-ABFD-140AF88B3681}"/>
               </a:ext>
             </a:extLst>
           </p:cNvPr>
@@ -5602,7 +5602,7 @@
           <p:cNvPr id="12" name="TextBox 11">
             <a:extLst>
               <a:ext uri="{FF2B5EF4-FFF2-40B4-BE49-F238E27FC236}">
-                <a16:creationId xmlns:a16="http://schemas.microsoft.com/office/drawing/2014/main" xmlns="" id="{C62171D1-2A5B-7A4A-9760-17CCE51B9802}"/>
+                <a16:creationId xmlns="" xmlns:a16="http://schemas.microsoft.com/office/drawing/2014/main" id="{C62171D1-2A5B-7A4A-9760-17CCE51B9802}"/>
               </a:ext>
             </a:extLst>
           </p:cNvPr>
@@ -5648,7 +5648,7 @@
           <p:cNvPr id="13" name="Straight Connector 59">
             <a:extLst>
               <a:ext uri="{FF2B5EF4-FFF2-40B4-BE49-F238E27FC236}">
-                <a16:creationId xmlns:a16="http://schemas.microsoft.com/office/drawing/2014/main" xmlns="" id="{3C71A0C3-CD3E-0748-98E5-6B2507CAB296}"/>
+                <a16:creationId xmlns="" xmlns:a16="http://schemas.microsoft.com/office/drawing/2014/main" id="{3C71A0C3-CD3E-0748-98E5-6B2507CAB296}"/>
               </a:ext>
             </a:extLst>
           </p:cNvPr>
@@ -5691,7 +5691,7 @@
           <p:cNvPr id="20" name="Текст 37">
             <a:extLst>
               <a:ext uri="{FF2B5EF4-FFF2-40B4-BE49-F238E27FC236}">
-                <a16:creationId xmlns:a16="http://schemas.microsoft.com/office/drawing/2014/main" xmlns="" id="{C0A1CB46-D6D6-5E48-B4F7-CCED4525C46F}"/>
+                <a16:creationId xmlns="" xmlns:a16="http://schemas.microsoft.com/office/drawing/2014/main" id="{C0A1CB46-D6D6-5E48-B4F7-CCED4525C46F}"/>
               </a:ext>
             </a:extLst>
           </p:cNvPr>
@@ -5808,7 +5808,7 @@
           <p:cNvPr id="21" name="Текст 39">
             <a:extLst>
               <a:ext uri="{FF2B5EF4-FFF2-40B4-BE49-F238E27FC236}">
-                <a16:creationId xmlns:a16="http://schemas.microsoft.com/office/drawing/2014/main" xmlns="" id="{25D35A19-1AA8-204A-BFCA-83B65D59CFF4}"/>
+                <a16:creationId xmlns="" xmlns:a16="http://schemas.microsoft.com/office/drawing/2014/main" id="{25D35A19-1AA8-204A-BFCA-83B65D59CFF4}"/>
               </a:ext>
             </a:extLst>
           </p:cNvPr>
@@ -5915,7 +5915,7 @@
           <p:cNvPr id="22" name="Текст 39">
             <a:extLst>
               <a:ext uri="{FF2B5EF4-FFF2-40B4-BE49-F238E27FC236}">
-                <a16:creationId xmlns:a16="http://schemas.microsoft.com/office/drawing/2014/main" xmlns="" id="{3557077C-F503-0B4A-82A2-54D21547E589}"/>
+                <a16:creationId xmlns="" xmlns:a16="http://schemas.microsoft.com/office/drawing/2014/main" id="{3557077C-F503-0B4A-82A2-54D21547E589}"/>
               </a:ext>
             </a:extLst>
           </p:cNvPr>
@@ -6110,7 +6110,7 @@
           <p:cNvPr id="10" name="Picture 4" descr="Icon&#10;&#10;Description automatically generated">
             <a:extLst>
               <a:ext uri="{FF2B5EF4-FFF2-40B4-BE49-F238E27FC236}">
-                <a16:creationId xmlns:a16="http://schemas.microsoft.com/office/drawing/2014/main" xmlns="" id="{4A1436AC-5F96-2A4F-BFC7-B3442083EBE4}"/>
+                <a16:creationId xmlns="" xmlns:a16="http://schemas.microsoft.com/office/drawing/2014/main" id="{4A1436AC-5F96-2A4F-BFC7-B3442083EBE4}"/>
               </a:ext>
             </a:extLst>
           </p:cNvPr>
@@ -6140,7 +6140,7 @@
           <p:cNvPr id="11" name="Straight Connector 19">
             <a:extLst>
               <a:ext uri="{FF2B5EF4-FFF2-40B4-BE49-F238E27FC236}">
-                <a16:creationId xmlns:a16="http://schemas.microsoft.com/office/drawing/2014/main" xmlns="" id="{067DD2ED-246D-7D41-B51F-FED98BF873FD}"/>
+                <a16:creationId xmlns="" xmlns:a16="http://schemas.microsoft.com/office/drawing/2014/main" id="{067DD2ED-246D-7D41-B51F-FED98BF873FD}"/>
               </a:ext>
             </a:extLst>
           </p:cNvPr>
@@ -6183,7 +6183,7 @@
           <p:cNvPr id="12" name="Straight Connector 21">
             <a:extLst>
               <a:ext uri="{FF2B5EF4-FFF2-40B4-BE49-F238E27FC236}">
-                <a16:creationId xmlns:a16="http://schemas.microsoft.com/office/drawing/2014/main" xmlns="" id="{68E8C250-D449-A743-8975-B5BFB04D9744}"/>
+                <a16:creationId xmlns="" xmlns:a16="http://schemas.microsoft.com/office/drawing/2014/main" id="{68E8C250-D449-A743-8975-B5BFB04D9744}"/>
               </a:ext>
             </a:extLst>
           </p:cNvPr>
@@ -6226,7 +6226,7 @@
           <p:cNvPr id="13" name="Straight Connector 25">
             <a:extLst>
               <a:ext uri="{FF2B5EF4-FFF2-40B4-BE49-F238E27FC236}">
-                <a16:creationId xmlns:a16="http://schemas.microsoft.com/office/drawing/2014/main" xmlns="" id="{DD1C71CA-B883-AF42-959D-BCA5690AAA4B}"/>
+                <a16:creationId xmlns="" xmlns:a16="http://schemas.microsoft.com/office/drawing/2014/main" id="{DD1C71CA-B883-AF42-959D-BCA5690AAA4B}"/>
               </a:ext>
             </a:extLst>
           </p:cNvPr>
@@ -6269,7 +6269,7 @@
           <p:cNvPr id="17" name="TextBox 16">
             <a:extLst>
               <a:ext uri="{FF2B5EF4-FFF2-40B4-BE49-F238E27FC236}">
-                <a16:creationId xmlns:a16="http://schemas.microsoft.com/office/drawing/2014/main" xmlns="" id="{24D3A12E-0E10-C441-81D2-C3C1EB6A0537}"/>
+                <a16:creationId xmlns="" xmlns:a16="http://schemas.microsoft.com/office/drawing/2014/main" id="{24D3A12E-0E10-C441-81D2-C3C1EB6A0537}"/>
               </a:ext>
             </a:extLst>
           </p:cNvPr>
@@ -6315,7 +6315,7 @@
           <p:cNvPr id="19" name="Straight Connector 59">
             <a:extLst>
               <a:ext uri="{FF2B5EF4-FFF2-40B4-BE49-F238E27FC236}">
-                <a16:creationId xmlns:a16="http://schemas.microsoft.com/office/drawing/2014/main" xmlns="" id="{3447008E-4F3B-FC4E-B96D-3927FAE1ED17}"/>
+                <a16:creationId xmlns="" xmlns:a16="http://schemas.microsoft.com/office/drawing/2014/main" id="{3447008E-4F3B-FC4E-B96D-3927FAE1ED17}"/>
               </a:ext>
             </a:extLst>
           </p:cNvPr>
@@ -6358,7 +6358,7 @@
           <p:cNvPr id="24" name="Рисунок 23">
             <a:extLst>
               <a:ext uri="{FF2B5EF4-FFF2-40B4-BE49-F238E27FC236}">
-                <a16:creationId xmlns:a16="http://schemas.microsoft.com/office/drawing/2014/main" xmlns="" id="{61115A7A-23E5-E442-9551-F72F1CDA57B9}"/>
+                <a16:creationId xmlns="" xmlns:a16="http://schemas.microsoft.com/office/drawing/2014/main" id="{61115A7A-23E5-E442-9551-F72F1CDA57B9}"/>
               </a:ext>
             </a:extLst>
           </p:cNvPr>
@@ -6435,7 +6435,7 @@
           <p:cNvPr id="32" name="Заголовок 31">
             <a:extLst>
               <a:ext uri="{FF2B5EF4-FFF2-40B4-BE49-F238E27FC236}">
-                <a16:creationId xmlns:a16="http://schemas.microsoft.com/office/drawing/2014/main" xmlns="" id="{9ED7AA97-D972-DF4F-B662-A65F2A544CC5}"/>
+                <a16:creationId xmlns="" xmlns:a16="http://schemas.microsoft.com/office/drawing/2014/main" id="{9ED7AA97-D972-DF4F-B662-A65F2A544CC5}"/>
               </a:ext>
             </a:extLst>
           </p:cNvPr>
@@ -6511,7 +6511,7 @@
           <p:cNvPr id="36" name="Текст 35">
             <a:extLst>
               <a:ext uri="{FF2B5EF4-FFF2-40B4-BE49-F238E27FC236}">
-                <a16:creationId xmlns:a16="http://schemas.microsoft.com/office/drawing/2014/main" xmlns="" id="{69E35E54-2B19-7441-876F-1C6A84F4F156}"/>
+                <a16:creationId xmlns="" xmlns:a16="http://schemas.microsoft.com/office/drawing/2014/main" id="{69E35E54-2B19-7441-876F-1C6A84F4F156}"/>
               </a:ext>
             </a:extLst>
           </p:cNvPr>
@@ -6652,7 +6652,7 @@
           <p:cNvPr id="38" name="Текст 37">
             <a:extLst>
               <a:ext uri="{FF2B5EF4-FFF2-40B4-BE49-F238E27FC236}">
-                <a16:creationId xmlns:a16="http://schemas.microsoft.com/office/drawing/2014/main" xmlns="" id="{7FB4A275-856E-364D-8AA4-2071AADC6AAA}"/>
+                <a16:creationId xmlns="" xmlns:a16="http://schemas.microsoft.com/office/drawing/2014/main" id="{7FB4A275-856E-364D-8AA4-2071AADC6AAA}"/>
               </a:ext>
             </a:extLst>
           </p:cNvPr>
@@ -6769,7 +6769,7 @@
           <p:cNvPr id="40" name="Текст 39">
             <a:extLst>
               <a:ext uri="{FF2B5EF4-FFF2-40B4-BE49-F238E27FC236}">
-                <a16:creationId xmlns:a16="http://schemas.microsoft.com/office/drawing/2014/main" xmlns="" id="{58FBA0EA-8BE0-A643-B258-4E5C34467172}"/>
+                <a16:creationId xmlns="" xmlns:a16="http://schemas.microsoft.com/office/drawing/2014/main" id="{58FBA0EA-8BE0-A643-B258-4E5C34467172}"/>
               </a:ext>
             </a:extLst>
           </p:cNvPr>
@@ -6876,7 +6876,7 @@
           <p:cNvPr id="41" name="Текст 39">
             <a:extLst>
               <a:ext uri="{FF2B5EF4-FFF2-40B4-BE49-F238E27FC236}">
-                <a16:creationId xmlns:a16="http://schemas.microsoft.com/office/drawing/2014/main" xmlns="" id="{0BEC062F-1BEB-DE4C-B7EE-C552C9D45F13}"/>
+                <a16:creationId xmlns="" xmlns:a16="http://schemas.microsoft.com/office/drawing/2014/main" id="{0BEC062F-1BEB-DE4C-B7EE-C552C9D45F13}"/>
               </a:ext>
             </a:extLst>
           </p:cNvPr>
@@ -7027,7 +7027,7 @@
           <p:cNvPr id="7" name="Picture 4" descr="Icon&#10;&#10;Description automatically generated">
             <a:extLst>
               <a:ext uri="{FF2B5EF4-FFF2-40B4-BE49-F238E27FC236}">
-                <a16:creationId xmlns:a16="http://schemas.microsoft.com/office/drawing/2014/main" xmlns="" id="{FDC66DB8-29BC-5940-A721-40F10021456A}"/>
+                <a16:creationId xmlns="" xmlns:a16="http://schemas.microsoft.com/office/drawing/2014/main" id="{FDC66DB8-29BC-5940-A721-40F10021456A}"/>
               </a:ext>
             </a:extLst>
           </p:cNvPr>
@@ -7057,7 +7057,7 @@
           <p:cNvPr id="8" name="Straight Connector 19">
             <a:extLst>
               <a:ext uri="{FF2B5EF4-FFF2-40B4-BE49-F238E27FC236}">
-                <a16:creationId xmlns:a16="http://schemas.microsoft.com/office/drawing/2014/main" xmlns="" id="{DE27C859-478F-3648-8A9D-2C85DBDCAC09}"/>
+                <a16:creationId xmlns="" xmlns:a16="http://schemas.microsoft.com/office/drawing/2014/main" id="{DE27C859-478F-3648-8A9D-2C85DBDCAC09}"/>
               </a:ext>
             </a:extLst>
           </p:cNvPr>
@@ -7100,7 +7100,7 @@
           <p:cNvPr id="9" name="Straight Connector 21">
             <a:extLst>
               <a:ext uri="{FF2B5EF4-FFF2-40B4-BE49-F238E27FC236}">
-                <a16:creationId xmlns:a16="http://schemas.microsoft.com/office/drawing/2014/main" xmlns="" id="{58EA1144-CFD8-1D47-B430-7014F576043B}"/>
+                <a16:creationId xmlns="" xmlns:a16="http://schemas.microsoft.com/office/drawing/2014/main" id="{58EA1144-CFD8-1D47-B430-7014F576043B}"/>
               </a:ext>
             </a:extLst>
           </p:cNvPr>
@@ -7143,7 +7143,7 @@
           <p:cNvPr id="10" name="Straight Connector 25">
             <a:extLst>
               <a:ext uri="{FF2B5EF4-FFF2-40B4-BE49-F238E27FC236}">
-                <a16:creationId xmlns:a16="http://schemas.microsoft.com/office/drawing/2014/main" xmlns="" id="{96EDC73C-5A3C-014E-8E52-04CAFCA9B20B}"/>
+                <a16:creationId xmlns="" xmlns:a16="http://schemas.microsoft.com/office/drawing/2014/main" id="{96EDC73C-5A3C-014E-8E52-04CAFCA9B20B}"/>
               </a:ext>
             </a:extLst>
           </p:cNvPr>
@@ -7186,7 +7186,7 @@
           <p:cNvPr id="11" name="TextBox 10">
             <a:extLst>
               <a:ext uri="{FF2B5EF4-FFF2-40B4-BE49-F238E27FC236}">
-                <a16:creationId xmlns:a16="http://schemas.microsoft.com/office/drawing/2014/main" xmlns="" id="{55E88681-53A8-3B45-B80A-372EDFB53883}"/>
+                <a16:creationId xmlns="" xmlns:a16="http://schemas.microsoft.com/office/drawing/2014/main" id="{55E88681-53A8-3B45-B80A-372EDFB53883}"/>
               </a:ext>
             </a:extLst>
           </p:cNvPr>
@@ -7232,7 +7232,7 @@
           <p:cNvPr id="12" name="Straight Connector 59">
             <a:extLst>
               <a:ext uri="{FF2B5EF4-FFF2-40B4-BE49-F238E27FC236}">
-                <a16:creationId xmlns:a16="http://schemas.microsoft.com/office/drawing/2014/main" xmlns="" id="{EDA7D8BF-DF37-704F-B77F-7E40752ACE25}"/>
+                <a16:creationId xmlns="" xmlns:a16="http://schemas.microsoft.com/office/drawing/2014/main" id="{EDA7D8BF-DF37-704F-B77F-7E40752ACE25}"/>
               </a:ext>
             </a:extLst>
           </p:cNvPr>
@@ -7275,7 +7275,7 @@
           <p:cNvPr id="16" name="Заголовок 31">
             <a:extLst>
               <a:ext uri="{FF2B5EF4-FFF2-40B4-BE49-F238E27FC236}">
-                <a16:creationId xmlns:a16="http://schemas.microsoft.com/office/drawing/2014/main" xmlns="" id="{76942483-EB13-0A4B-8060-DB65024C294E}"/>
+                <a16:creationId xmlns="" xmlns:a16="http://schemas.microsoft.com/office/drawing/2014/main" id="{76942483-EB13-0A4B-8060-DB65024C294E}"/>
               </a:ext>
             </a:extLst>
           </p:cNvPr>
@@ -7351,7 +7351,7 @@
           <p:cNvPr id="17" name="Текст 35">
             <a:extLst>
               <a:ext uri="{FF2B5EF4-FFF2-40B4-BE49-F238E27FC236}">
-                <a16:creationId xmlns:a16="http://schemas.microsoft.com/office/drawing/2014/main" xmlns="" id="{66FAD63B-F743-0F47-BBE3-D7731766705A}"/>
+                <a16:creationId xmlns="" xmlns:a16="http://schemas.microsoft.com/office/drawing/2014/main" id="{66FAD63B-F743-0F47-BBE3-D7731766705A}"/>
               </a:ext>
             </a:extLst>
           </p:cNvPr>
@@ -7499,7 +7499,7 @@
           <p:cNvPr id="21" name="Текст 37">
             <a:extLst>
               <a:ext uri="{FF2B5EF4-FFF2-40B4-BE49-F238E27FC236}">
-                <a16:creationId xmlns:a16="http://schemas.microsoft.com/office/drawing/2014/main" xmlns="" id="{45421580-30B9-AE44-9576-3890C98F5E85}"/>
+                <a16:creationId xmlns="" xmlns:a16="http://schemas.microsoft.com/office/drawing/2014/main" id="{45421580-30B9-AE44-9576-3890C98F5E85}"/>
               </a:ext>
             </a:extLst>
           </p:cNvPr>
@@ -7616,7 +7616,7 @@
           <p:cNvPr id="22" name="Текст 39">
             <a:extLst>
               <a:ext uri="{FF2B5EF4-FFF2-40B4-BE49-F238E27FC236}">
-                <a16:creationId xmlns:a16="http://schemas.microsoft.com/office/drawing/2014/main" xmlns="" id="{778A6943-08BD-8C4D-A524-728A4340014C}"/>
+                <a16:creationId xmlns="" xmlns:a16="http://schemas.microsoft.com/office/drawing/2014/main" id="{778A6943-08BD-8C4D-A524-728A4340014C}"/>
               </a:ext>
             </a:extLst>
           </p:cNvPr>
@@ -7723,7 +7723,7 @@
           <p:cNvPr id="23" name="Текст 39">
             <a:extLst>
               <a:ext uri="{FF2B5EF4-FFF2-40B4-BE49-F238E27FC236}">
-                <a16:creationId xmlns:a16="http://schemas.microsoft.com/office/drawing/2014/main" xmlns="" id="{EB90A960-EE54-5742-BBB0-8536917AD4C0}"/>
+                <a16:creationId xmlns="" xmlns:a16="http://schemas.microsoft.com/office/drawing/2014/main" id="{EB90A960-EE54-5742-BBB0-8536917AD4C0}"/>
               </a:ext>
             </a:extLst>
           </p:cNvPr>
@@ -7874,7 +7874,7 @@
           <p:cNvPr id="7" name="Picture 4" descr="Icon&#10;&#10;Description automatically generated">
             <a:extLst>
               <a:ext uri="{FF2B5EF4-FFF2-40B4-BE49-F238E27FC236}">
-                <a16:creationId xmlns:a16="http://schemas.microsoft.com/office/drawing/2014/main" xmlns="" id="{0E78CA68-7A0C-CF41-9AC6-A547FB9EC3B0}"/>
+                <a16:creationId xmlns="" xmlns:a16="http://schemas.microsoft.com/office/drawing/2014/main" id="{0E78CA68-7A0C-CF41-9AC6-A547FB9EC3B0}"/>
               </a:ext>
             </a:extLst>
           </p:cNvPr>
@@ -7904,7 +7904,7 @@
           <p:cNvPr id="8" name="Straight Connector 19">
             <a:extLst>
               <a:ext uri="{FF2B5EF4-FFF2-40B4-BE49-F238E27FC236}">
-                <a16:creationId xmlns:a16="http://schemas.microsoft.com/office/drawing/2014/main" xmlns="" id="{45DC512A-A23B-B24D-A1F6-6793976867CF}"/>
+                <a16:creationId xmlns="" xmlns:a16="http://schemas.microsoft.com/office/drawing/2014/main" id="{45DC512A-A23B-B24D-A1F6-6793976867CF}"/>
               </a:ext>
             </a:extLst>
           </p:cNvPr>
@@ -7947,7 +7947,7 @@
           <p:cNvPr id="9" name="Straight Connector 21">
             <a:extLst>
               <a:ext uri="{FF2B5EF4-FFF2-40B4-BE49-F238E27FC236}">
-                <a16:creationId xmlns:a16="http://schemas.microsoft.com/office/drawing/2014/main" xmlns="" id="{21F91649-DF0F-5F45-A43B-2CED9ACDD049}"/>
+                <a16:creationId xmlns="" xmlns:a16="http://schemas.microsoft.com/office/drawing/2014/main" id="{21F91649-DF0F-5F45-A43B-2CED9ACDD049}"/>
               </a:ext>
             </a:extLst>
           </p:cNvPr>
@@ -7990,7 +7990,7 @@
           <p:cNvPr id="10" name="Straight Connector 25">
             <a:extLst>
               <a:ext uri="{FF2B5EF4-FFF2-40B4-BE49-F238E27FC236}">
-                <a16:creationId xmlns:a16="http://schemas.microsoft.com/office/drawing/2014/main" xmlns="" id="{3137B760-1A50-1845-B7F2-1EF31C71C72B}"/>
+                <a16:creationId xmlns="" xmlns:a16="http://schemas.microsoft.com/office/drawing/2014/main" id="{3137B760-1A50-1845-B7F2-1EF31C71C72B}"/>
               </a:ext>
             </a:extLst>
           </p:cNvPr>
@@ -8033,7 +8033,7 @@
           <p:cNvPr id="11" name="TextBox 10">
             <a:extLst>
               <a:ext uri="{FF2B5EF4-FFF2-40B4-BE49-F238E27FC236}">
-                <a16:creationId xmlns:a16="http://schemas.microsoft.com/office/drawing/2014/main" xmlns="" id="{05ECCF8F-5855-7943-B503-5573887A534D}"/>
+                <a16:creationId xmlns="" xmlns:a16="http://schemas.microsoft.com/office/drawing/2014/main" id="{05ECCF8F-5855-7943-B503-5573887A534D}"/>
               </a:ext>
             </a:extLst>
           </p:cNvPr>
@@ -8079,7 +8079,7 @@
           <p:cNvPr id="12" name="Straight Connector 59">
             <a:extLst>
               <a:ext uri="{FF2B5EF4-FFF2-40B4-BE49-F238E27FC236}">
-                <a16:creationId xmlns:a16="http://schemas.microsoft.com/office/drawing/2014/main" xmlns="" id="{FB81B23D-CDD8-E64C-9887-3540F7EE1C4B}"/>
+                <a16:creationId xmlns="" xmlns:a16="http://schemas.microsoft.com/office/drawing/2014/main" id="{FB81B23D-CDD8-E64C-9887-3540F7EE1C4B}"/>
               </a:ext>
             </a:extLst>
           </p:cNvPr>
@@ -8122,7 +8122,7 @@
           <p:cNvPr id="17" name="Текст 35">
             <a:extLst>
               <a:ext uri="{FF2B5EF4-FFF2-40B4-BE49-F238E27FC236}">
-                <a16:creationId xmlns:a16="http://schemas.microsoft.com/office/drawing/2014/main" xmlns="" id="{5163BE0A-A745-414A-AF21-D968BD69D2DA}"/>
+                <a16:creationId xmlns="" xmlns:a16="http://schemas.microsoft.com/office/drawing/2014/main" id="{5163BE0A-A745-414A-AF21-D968BD69D2DA}"/>
               </a:ext>
             </a:extLst>
           </p:cNvPr>
@@ -8281,7 +8281,7 @@
           <p:cNvPr id="20" name="Текст 35">
             <a:extLst>
               <a:ext uri="{FF2B5EF4-FFF2-40B4-BE49-F238E27FC236}">
-                <a16:creationId xmlns:a16="http://schemas.microsoft.com/office/drawing/2014/main" xmlns="" id="{B3D47CF6-5FC1-2346-8894-A7CC39063DE3}"/>
+                <a16:creationId xmlns="" xmlns:a16="http://schemas.microsoft.com/office/drawing/2014/main" id="{B3D47CF6-5FC1-2346-8894-A7CC39063DE3}"/>
               </a:ext>
             </a:extLst>
           </p:cNvPr>
@@ -8423,7 +8423,7 @@
           <p:cNvPr id="23" name="Текст 22">
             <a:extLst>
               <a:ext uri="{FF2B5EF4-FFF2-40B4-BE49-F238E27FC236}">
-                <a16:creationId xmlns:a16="http://schemas.microsoft.com/office/drawing/2014/main" xmlns="" id="{CD14B8F3-89C2-9F45-809E-D1EAF85AC566}"/>
+                <a16:creationId xmlns="" xmlns:a16="http://schemas.microsoft.com/office/drawing/2014/main" id="{CD14B8F3-89C2-9F45-809E-D1EAF85AC566}"/>
               </a:ext>
             </a:extLst>
           </p:cNvPr>
@@ -8495,7 +8495,7 @@
           <p:cNvPr id="25" name="Заголовок 31">
             <a:extLst>
               <a:ext uri="{FF2B5EF4-FFF2-40B4-BE49-F238E27FC236}">
-                <a16:creationId xmlns:a16="http://schemas.microsoft.com/office/drawing/2014/main" xmlns="" id="{B32DC3D4-97A5-3E4F-A29B-422D5E3129B7}"/>
+                <a16:creationId xmlns="" xmlns:a16="http://schemas.microsoft.com/office/drawing/2014/main" id="{B32DC3D4-97A5-3E4F-A29B-422D5E3129B7}"/>
               </a:ext>
             </a:extLst>
           </p:cNvPr>
@@ -8571,7 +8571,7 @@
           <p:cNvPr id="15" name="Текст 37">
             <a:extLst>
               <a:ext uri="{FF2B5EF4-FFF2-40B4-BE49-F238E27FC236}">
-                <a16:creationId xmlns:a16="http://schemas.microsoft.com/office/drawing/2014/main" xmlns="" id="{87E14987-3496-B241-A4C9-88FACDD837F5}"/>
+                <a16:creationId xmlns="" xmlns:a16="http://schemas.microsoft.com/office/drawing/2014/main" id="{87E14987-3496-B241-A4C9-88FACDD837F5}"/>
               </a:ext>
             </a:extLst>
           </p:cNvPr>
@@ -8688,7 +8688,7 @@
           <p:cNvPr id="16" name="Текст 39">
             <a:extLst>
               <a:ext uri="{FF2B5EF4-FFF2-40B4-BE49-F238E27FC236}">
-                <a16:creationId xmlns:a16="http://schemas.microsoft.com/office/drawing/2014/main" xmlns="" id="{3DAEB9AB-245D-774E-9656-B80FCC7A20BB}"/>
+                <a16:creationId xmlns="" xmlns:a16="http://schemas.microsoft.com/office/drawing/2014/main" id="{3DAEB9AB-245D-774E-9656-B80FCC7A20BB}"/>
               </a:ext>
             </a:extLst>
           </p:cNvPr>
@@ -8795,7 +8795,7 @@
           <p:cNvPr id="18" name="Текст 39">
             <a:extLst>
               <a:ext uri="{FF2B5EF4-FFF2-40B4-BE49-F238E27FC236}">
-                <a16:creationId xmlns:a16="http://schemas.microsoft.com/office/drawing/2014/main" xmlns="" id="{98145217-7421-9C4F-9483-5AEA3D289575}"/>
+                <a16:creationId xmlns="" xmlns:a16="http://schemas.microsoft.com/office/drawing/2014/main" id="{98145217-7421-9C4F-9483-5AEA3D289575}"/>
               </a:ext>
             </a:extLst>
           </p:cNvPr>
@@ -8946,7 +8946,7 @@
           <p:cNvPr id="7" name="Picture 4" descr="Icon&#10;&#10;Description automatically generated">
             <a:extLst>
               <a:ext uri="{FF2B5EF4-FFF2-40B4-BE49-F238E27FC236}">
-                <a16:creationId xmlns:a16="http://schemas.microsoft.com/office/drawing/2014/main" xmlns="" id="{9E89D752-CAC6-0943-9A3D-4C52DBF50CE2}"/>
+                <a16:creationId xmlns="" xmlns:a16="http://schemas.microsoft.com/office/drawing/2014/main" id="{9E89D752-CAC6-0943-9A3D-4C52DBF50CE2}"/>
               </a:ext>
             </a:extLst>
           </p:cNvPr>
@@ -8976,7 +8976,7 @@
           <p:cNvPr id="8" name="Straight Connector 19">
             <a:extLst>
               <a:ext uri="{FF2B5EF4-FFF2-40B4-BE49-F238E27FC236}">
-                <a16:creationId xmlns:a16="http://schemas.microsoft.com/office/drawing/2014/main" xmlns="" id="{64D89E64-93BB-044D-B3D4-8F2679C5CA4C}"/>
+                <a16:creationId xmlns="" xmlns:a16="http://schemas.microsoft.com/office/drawing/2014/main" id="{64D89E64-93BB-044D-B3D4-8F2679C5CA4C}"/>
               </a:ext>
             </a:extLst>
           </p:cNvPr>
@@ -9019,7 +9019,7 @@
           <p:cNvPr id="9" name="Straight Connector 21">
             <a:extLst>
               <a:ext uri="{FF2B5EF4-FFF2-40B4-BE49-F238E27FC236}">
-                <a16:creationId xmlns:a16="http://schemas.microsoft.com/office/drawing/2014/main" xmlns="" id="{D0C3B169-866D-C645-AF76-00F8C2A97E9B}"/>
+                <a16:creationId xmlns="" xmlns:a16="http://schemas.microsoft.com/office/drawing/2014/main" id="{D0C3B169-866D-C645-AF76-00F8C2A97E9B}"/>
               </a:ext>
             </a:extLst>
           </p:cNvPr>
@@ -9062,7 +9062,7 @@
           <p:cNvPr id="10" name="Straight Connector 25">
             <a:extLst>
               <a:ext uri="{FF2B5EF4-FFF2-40B4-BE49-F238E27FC236}">
-                <a16:creationId xmlns:a16="http://schemas.microsoft.com/office/drawing/2014/main" xmlns="" id="{FDDF48AB-D8AE-0E42-A544-8EA5B8744778}"/>
+                <a16:creationId xmlns="" xmlns:a16="http://schemas.microsoft.com/office/drawing/2014/main" id="{FDDF48AB-D8AE-0E42-A544-8EA5B8744778}"/>
               </a:ext>
             </a:extLst>
           </p:cNvPr>
@@ -9105,7 +9105,7 @@
           <p:cNvPr id="11" name="TextBox 10">
             <a:extLst>
               <a:ext uri="{FF2B5EF4-FFF2-40B4-BE49-F238E27FC236}">
-                <a16:creationId xmlns:a16="http://schemas.microsoft.com/office/drawing/2014/main" xmlns="" id="{66DF89EC-1E7C-3B40-85F4-6D19A7D29AC7}"/>
+                <a16:creationId xmlns="" xmlns:a16="http://schemas.microsoft.com/office/drawing/2014/main" id="{66DF89EC-1E7C-3B40-85F4-6D19A7D29AC7}"/>
               </a:ext>
             </a:extLst>
           </p:cNvPr>
@@ -9151,7 +9151,7 @@
           <p:cNvPr id="12" name="Straight Connector 59">
             <a:extLst>
               <a:ext uri="{FF2B5EF4-FFF2-40B4-BE49-F238E27FC236}">
-                <a16:creationId xmlns:a16="http://schemas.microsoft.com/office/drawing/2014/main" xmlns="" id="{019D6862-BD52-734D-9E19-38C147CA2D29}"/>
+                <a16:creationId xmlns="" xmlns:a16="http://schemas.microsoft.com/office/drawing/2014/main" id="{019D6862-BD52-734D-9E19-38C147CA2D29}"/>
               </a:ext>
             </a:extLst>
           </p:cNvPr>
@@ -9194,7 +9194,7 @@
           <p:cNvPr id="17" name="Заголовок 31">
             <a:extLst>
               <a:ext uri="{FF2B5EF4-FFF2-40B4-BE49-F238E27FC236}">
-                <a16:creationId xmlns:a16="http://schemas.microsoft.com/office/drawing/2014/main" xmlns="" id="{B3F16318-C9C3-B948-A508-4BC53D0B7716}"/>
+                <a16:creationId xmlns="" xmlns:a16="http://schemas.microsoft.com/office/drawing/2014/main" id="{B3F16318-C9C3-B948-A508-4BC53D0B7716}"/>
               </a:ext>
             </a:extLst>
           </p:cNvPr>
@@ -9270,7 +9270,7 @@
           <p:cNvPr id="18" name="Текст 35">
             <a:extLst>
               <a:ext uri="{FF2B5EF4-FFF2-40B4-BE49-F238E27FC236}">
-                <a16:creationId xmlns:a16="http://schemas.microsoft.com/office/drawing/2014/main" xmlns="" id="{23B3E5FB-BBCE-4149-AD9A-8CAB06CC9FCF}"/>
+                <a16:creationId xmlns="" xmlns:a16="http://schemas.microsoft.com/office/drawing/2014/main" id="{23B3E5FB-BBCE-4149-AD9A-8CAB06CC9FCF}"/>
               </a:ext>
             </a:extLst>
           </p:cNvPr>
@@ -9952,7 +9952,7 @@
           <p:cNvPr id="19" name="Текст 35">
             <a:extLst>
               <a:ext uri="{FF2B5EF4-FFF2-40B4-BE49-F238E27FC236}">
-                <a16:creationId xmlns:a16="http://schemas.microsoft.com/office/drawing/2014/main" xmlns="" id="{658542D3-7E45-6E46-8039-27C4C43DD617}"/>
+                <a16:creationId xmlns="" xmlns:a16="http://schemas.microsoft.com/office/drawing/2014/main" id="{658542D3-7E45-6E46-8039-27C4C43DD617}"/>
               </a:ext>
             </a:extLst>
           </p:cNvPr>
@@ -10094,7 +10094,7 @@
           <p:cNvPr id="21" name="Диаграмма 7">
             <a:extLst>
               <a:ext uri="{FF2B5EF4-FFF2-40B4-BE49-F238E27FC236}">
-                <a16:creationId xmlns:a16="http://schemas.microsoft.com/office/drawing/2014/main" xmlns="" id="{57965DCA-4776-7546-97FD-A69317A34CF2}"/>
+                <a16:creationId xmlns="" xmlns:a16="http://schemas.microsoft.com/office/drawing/2014/main" id="{57965DCA-4776-7546-97FD-A69317A34CF2}"/>
               </a:ext>
             </a:extLst>
           </p:cNvPr>
@@ -10127,7 +10127,7 @@
           <p:cNvPr id="15" name="Текст 37">
             <a:extLst>
               <a:ext uri="{FF2B5EF4-FFF2-40B4-BE49-F238E27FC236}">
-                <a16:creationId xmlns:a16="http://schemas.microsoft.com/office/drawing/2014/main" xmlns="" id="{F0037DB7-9A83-3348-8DAE-CC70560E4099}"/>
+                <a16:creationId xmlns="" xmlns:a16="http://schemas.microsoft.com/office/drawing/2014/main" id="{F0037DB7-9A83-3348-8DAE-CC70560E4099}"/>
               </a:ext>
             </a:extLst>
           </p:cNvPr>
@@ -10244,7 +10244,7 @@
           <p:cNvPr id="20" name="Текст 39">
             <a:extLst>
               <a:ext uri="{FF2B5EF4-FFF2-40B4-BE49-F238E27FC236}">
-                <a16:creationId xmlns:a16="http://schemas.microsoft.com/office/drawing/2014/main" xmlns="" id="{4007716A-CF6E-BC4E-83BE-CC4A3F1F2008}"/>
+                <a16:creationId xmlns="" xmlns:a16="http://schemas.microsoft.com/office/drawing/2014/main" id="{4007716A-CF6E-BC4E-83BE-CC4A3F1F2008}"/>
               </a:ext>
             </a:extLst>
           </p:cNvPr>
@@ -10351,7 +10351,7 @@
           <p:cNvPr id="22" name="Текст 39">
             <a:extLst>
               <a:ext uri="{FF2B5EF4-FFF2-40B4-BE49-F238E27FC236}">
-                <a16:creationId xmlns:a16="http://schemas.microsoft.com/office/drawing/2014/main" xmlns="" id="{4921AC85-F824-C54B-91ED-6AB495D80D7A}"/>
+                <a16:creationId xmlns="" xmlns:a16="http://schemas.microsoft.com/office/drawing/2014/main" id="{4921AC85-F824-C54B-91ED-6AB495D80D7A}"/>
               </a:ext>
             </a:extLst>
           </p:cNvPr>
@@ -10502,7 +10502,7 @@
           <p:cNvPr id="8" name="Picture 4" descr="Icon&#10;&#10;Description automatically generated">
             <a:extLst>
               <a:ext uri="{FF2B5EF4-FFF2-40B4-BE49-F238E27FC236}">
-                <a16:creationId xmlns:a16="http://schemas.microsoft.com/office/drawing/2014/main" xmlns="" id="{11D7C3EB-CCEB-E142-9753-8B2D75A0A80D}"/>
+                <a16:creationId xmlns="" xmlns:a16="http://schemas.microsoft.com/office/drawing/2014/main" id="{11D7C3EB-CCEB-E142-9753-8B2D75A0A80D}"/>
               </a:ext>
             </a:extLst>
           </p:cNvPr>
@@ -10532,7 +10532,7 @@
           <p:cNvPr id="9" name="Straight Connector 19">
             <a:extLst>
               <a:ext uri="{FF2B5EF4-FFF2-40B4-BE49-F238E27FC236}">
-                <a16:creationId xmlns:a16="http://schemas.microsoft.com/office/drawing/2014/main" xmlns="" id="{527C9F89-51CC-D243-9351-73AB081DB944}"/>
+                <a16:creationId xmlns="" xmlns:a16="http://schemas.microsoft.com/office/drawing/2014/main" id="{527C9F89-51CC-D243-9351-73AB081DB944}"/>
               </a:ext>
             </a:extLst>
           </p:cNvPr>
@@ -10575,7 +10575,7 @@
           <p:cNvPr id="10" name="Straight Connector 21">
             <a:extLst>
               <a:ext uri="{FF2B5EF4-FFF2-40B4-BE49-F238E27FC236}">
-                <a16:creationId xmlns:a16="http://schemas.microsoft.com/office/drawing/2014/main" xmlns="" id="{F09EE119-6C80-E846-95F9-BB3907664128}"/>
+                <a16:creationId xmlns="" xmlns:a16="http://schemas.microsoft.com/office/drawing/2014/main" id="{F09EE119-6C80-E846-95F9-BB3907664128}"/>
               </a:ext>
             </a:extLst>
           </p:cNvPr>
@@ -10618,7 +10618,7 @@
           <p:cNvPr id="11" name="Straight Connector 25">
             <a:extLst>
               <a:ext uri="{FF2B5EF4-FFF2-40B4-BE49-F238E27FC236}">
-                <a16:creationId xmlns:a16="http://schemas.microsoft.com/office/drawing/2014/main" xmlns="" id="{6C0A681B-44BF-6A46-98D8-483EF13B9114}"/>
+                <a16:creationId xmlns="" xmlns:a16="http://schemas.microsoft.com/office/drawing/2014/main" id="{6C0A681B-44BF-6A46-98D8-483EF13B9114}"/>
               </a:ext>
             </a:extLst>
           </p:cNvPr>
@@ -10661,7 +10661,7 @@
           <p:cNvPr id="12" name="TextBox 11">
             <a:extLst>
               <a:ext uri="{FF2B5EF4-FFF2-40B4-BE49-F238E27FC236}">
-                <a16:creationId xmlns:a16="http://schemas.microsoft.com/office/drawing/2014/main" xmlns="" id="{C65A5D7C-EB12-9D4D-A99A-4B26C81B7387}"/>
+                <a16:creationId xmlns="" xmlns:a16="http://schemas.microsoft.com/office/drawing/2014/main" id="{C65A5D7C-EB12-9D4D-A99A-4B26C81B7387}"/>
               </a:ext>
             </a:extLst>
           </p:cNvPr>
@@ -10707,7 +10707,7 @@
           <p:cNvPr id="13" name="Straight Connector 59">
             <a:extLst>
               <a:ext uri="{FF2B5EF4-FFF2-40B4-BE49-F238E27FC236}">
-                <a16:creationId xmlns:a16="http://schemas.microsoft.com/office/drawing/2014/main" xmlns="" id="{D4C3D74D-BE91-9547-ADCA-ACCE93C18789}"/>
+                <a16:creationId xmlns="" xmlns:a16="http://schemas.microsoft.com/office/drawing/2014/main" id="{D4C3D74D-BE91-9547-ADCA-ACCE93C18789}"/>
               </a:ext>
             </a:extLst>
           </p:cNvPr>
@@ -10750,7 +10750,7 @@
           <p:cNvPr id="20" name="Текст 35">
             <a:extLst>
               <a:ext uri="{FF2B5EF4-FFF2-40B4-BE49-F238E27FC236}">
-                <a16:creationId xmlns:a16="http://schemas.microsoft.com/office/drawing/2014/main" xmlns="" id="{5812BF3C-1D24-3640-84D2-BFFCA525AE5F}"/>
+                <a16:creationId xmlns="" xmlns:a16="http://schemas.microsoft.com/office/drawing/2014/main" id="{5812BF3C-1D24-3640-84D2-BFFCA525AE5F}"/>
               </a:ext>
             </a:extLst>
           </p:cNvPr>
@@ -10886,7 +10886,7 @@
           <p:cNvPr id="21" name="Диаграмма 7">
             <a:extLst>
               <a:ext uri="{FF2B5EF4-FFF2-40B4-BE49-F238E27FC236}">
-                <a16:creationId xmlns:a16="http://schemas.microsoft.com/office/drawing/2014/main" xmlns="" id="{BCBBDD44-9DC9-F74E-979F-120A7BBD4EE1}"/>
+                <a16:creationId xmlns="" xmlns:a16="http://schemas.microsoft.com/office/drawing/2014/main" id="{BCBBDD44-9DC9-F74E-979F-120A7BBD4EE1}"/>
               </a:ext>
             </a:extLst>
           </p:cNvPr>
@@ -10919,7 +10919,7 @@
           <p:cNvPr id="23" name="Текст 22">
             <a:extLst>
               <a:ext uri="{FF2B5EF4-FFF2-40B4-BE49-F238E27FC236}">
-                <a16:creationId xmlns:a16="http://schemas.microsoft.com/office/drawing/2014/main" xmlns="" id="{7C68DF7B-E804-E44B-83DF-5DC36AF76F43}"/>
+                <a16:creationId xmlns="" xmlns:a16="http://schemas.microsoft.com/office/drawing/2014/main" id="{7C68DF7B-E804-E44B-83DF-5DC36AF76F43}"/>
               </a:ext>
             </a:extLst>
           </p:cNvPr>
@@ -11028,7 +11028,7 @@
           <p:cNvPr id="28" name="Текст 35">
             <a:extLst>
               <a:ext uri="{FF2B5EF4-FFF2-40B4-BE49-F238E27FC236}">
-                <a16:creationId xmlns:a16="http://schemas.microsoft.com/office/drawing/2014/main" xmlns="" id="{89E931D8-2901-A54D-86EA-096E47B81880}"/>
+                <a16:creationId xmlns="" xmlns:a16="http://schemas.microsoft.com/office/drawing/2014/main" id="{89E931D8-2901-A54D-86EA-096E47B81880}"/>
               </a:ext>
             </a:extLst>
           </p:cNvPr>
@@ -11710,7 +11710,7 @@
           <p:cNvPr id="16" name="Текст 37">
             <a:extLst>
               <a:ext uri="{FF2B5EF4-FFF2-40B4-BE49-F238E27FC236}">
-                <a16:creationId xmlns:a16="http://schemas.microsoft.com/office/drawing/2014/main" xmlns="" id="{EB05FE86-9EEC-B64C-A6A4-0EF1E57F548F}"/>
+                <a16:creationId xmlns="" xmlns:a16="http://schemas.microsoft.com/office/drawing/2014/main" id="{EB05FE86-9EEC-B64C-A6A4-0EF1E57F548F}"/>
               </a:ext>
             </a:extLst>
           </p:cNvPr>
@@ -11827,7 +11827,7 @@
           <p:cNvPr id="18" name="Текст 39">
             <a:extLst>
               <a:ext uri="{FF2B5EF4-FFF2-40B4-BE49-F238E27FC236}">
-                <a16:creationId xmlns:a16="http://schemas.microsoft.com/office/drawing/2014/main" xmlns="" id="{897B1CBC-D3E1-5F42-9E46-5C5D5982A1A4}"/>
+                <a16:creationId xmlns="" xmlns:a16="http://schemas.microsoft.com/office/drawing/2014/main" id="{897B1CBC-D3E1-5F42-9E46-5C5D5982A1A4}"/>
               </a:ext>
             </a:extLst>
           </p:cNvPr>
@@ -11934,7 +11934,7 @@
           <p:cNvPr id="19" name="Текст 39">
             <a:extLst>
               <a:ext uri="{FF2B5EF4-FFF2-40B4-BE49-F238E27FC236}">
-                <a16:creationId xmlns:a16="http://schemas.microsoft.com/office/drawing/2014/main" xmlns="" id="{364269E6-245A-D54E-A8AD-14E29A03FAC1}"/>
+                <a16:creationId xmlns="" xmlns:a16="http://schemas.microsoft.com/office/drawing/2014/main" id="{364269E6-245A-D54E-A8AD-14E29A03FAC1}"/>
               </a:ext>
             </a:extLst>
           </p:cNvPr>
@@ -12085,7 +12085,7 @@
           <p:cNvPr id="6" name="Picture 4" descr="Icon&#10;&#10;Description automatically generated">
             <a:extLst>
               <a:ext uri="{FF2B5EF4-FFF2-40B4-BE49-F238E27FC236}">
-                <a16:creationId xmlns:a16="http://schemas.microsoft.com/office/drawing/2014/main" xmlns="" id="{E9A64721-E55E-8749-B29E-51DD8955936F}"/>
+                <a16:creationId xmlns="" xmlns:a16="http://schemas.microsoft.com/office/drawing/2014/main" id="{E9A64721-E55E-8749-B29E-51DD8955936F}"/>
               </a:ext>
             </a:extLst>
           </p:cNvPr>
@@ -12115,7 +12115,7 @@
           <p:cNvPr id="7" name="Straight Connector 19">
             <a:extLst>
               <a:ext uri="{FF2B5EF4-FFF2-40B4-BE49-F238E27FC236}">
-                <a16:creationId xmlns:a16="http://schemas.microsoft.com/office/drawing/2014/main" xmlns="" id="{B0C162B7-B84F-874A-960E-31F512518C6E}"/>
+                <a16:creationId xmlns="" xmlns:a16="http://schemas.microsoft.com/office/drawing/2014/main" id="{B0C162B7-B84F-874A-960E-31F512518C6E}"/>
               </a:ext>
             </a:extLst>
           </p:cNvPr>
@@ -12158,7 +12158,7 @@
           <p:cNvPr id="8" name="Straight Connector 21">
             <a:extLst>
               <a:ext uri="{FF2B5EF4-FFF2-40B4-BE49-F238E27FC236}">
-                <a16:creationId xmlns:a16="http://schemas.microsoft.com/office/drawing/2014/main" xmlns="" id="{1CB321BB-9FE3-294F-85D8-AA7DC75CA4AF}"/>
+                <a16:creationId xmlns="" xmlns:a16="http://schemas.microsoft.com/office/drawing/2014/main" id="{1CB321BB-9FE3-294F-85D8-AA7DC75CA4AF}"/>
               </a:ext>
             </a:extLst>
           </p:cNvPr>
@@ -12201,7 +12201,7 @@
           <p:cNvPr id="9" name="Straight Connector 25">
             <a:extLst>
               <a:ext uri="{FF2B5EF4-FFF2-40B4-BE49-F238E27FC236}">
-                <a16:creationId xmlns:a16="http://schemas.microsoft.com/office/drawing/2014/main" xmlns="" id="{0A610A45-8712-8A45-AFB3-931CF468EC32}"/>
+                <a16:creationId xmlns="" xmlns:a16="http://schemas.microsoft.com/office/drawing/2014/main" id="{0A610A45-8712-8A45-AFB3-931CF468EC32}"/>
               </a:ext>
             </a:extLst>
           </p:cNvPr>
@@ -12244,7 +12244,7 @@
           <p:cNvPr id="10" name="TextBox 9">
             <a:extLst>
               <a:ext uri="{FF2B5EF4-FFF2-40B4-BE49-F238E27FC236}">
-                <a16:creationId xmlns:a16="http://schemas.microsoft.com/office/drawing/2014/main" xmlns="" id="{30460EF6-ECAD-8941-8132-1B3E005D6067}"/>
+                <a16:creationId xmlns="" xmlns:a16="http://schemas.microsoft.com/office/drawing/2014/main" id="{30460EF6-ECAD-8941-8132-1B3E005D6067}"/>
               </a:ext>
             </a:extLst>
           </p:cNvPr>
@@ -12290,7 +12290,7 @@
           <p:cNvPr id="11" name="Straight Connector 59">
             <a:extLst>
               <a:ext uri="{FF2B5EF4-FFF2-40B4-BE49-F238E27FC236}">
-                <a16:creationId xmlns:a16="http://schemas.microsoft.com/office/drawing/2014/main" xmlns="" id="{41AE56A2-5FAA-FD44-AE1A-338E1E304184}"/>
+                <a16:creationId xmlns="" xmlns:a16="http://schemas.microsoft.com/office/drawing/2014/main" id="{41AE56A2-5FAA-FD44-AE1A-338E1E304184}"/>
               </a:ext>
             </a:extLst>
           </p:cNvPr>
@@ -12333,7 +12333,7 @@
           <p:cNvPr id="17" name="Заголовок 31">
             <a:extLst>
               <a:ext uri="{FF2B5EF4-FFF2-40B4-BE49-F238E27FC236}">
-                <a16:creationId xmlns:a16="http://schemas.microsoft.com/office/drawing/2014/main" xmlns="" id="{3B28B62E-5EE9-834C-9BB6-BD66079B8164}"/>
+                <a16:creationId xmlns="" xmlns:a16="http://schemas.microsoft.com/office/drawing/2014/main" id="{3B28B62E-5EE9-834C-9BB6-BD66079B8164}"/>
               </a:ext>
             </a:extLst>
           </p:cNvPr>
@@ -12409,7 +12409,7 @@
           <p:cNvPr id="24" name="Текст 35">
             <a:extLst>
               <a:ext uri="{FF2B5EF4-FFF2-40B4-BE49-F238E27FC236}">
-                <a16:creationId xmlns:a16="http://schemas.microsoft.com/office/drawing/2014/main" xmlns="" id="{621215DE-C1FD-2B4C-B236-AF679CF906BE}"/>
+                <a16:creationId xmlns="" xmlns:a16="http://schemas.microsoft.com/office/drawing/2014/main" id="{621215DE-C1FD-2B4C-B236-AF679CF906BE}"/>
               </a:ext>
             </a:extLst>
           </p:cNvPr>
@@ -12539,7 +12539,7 @@
           <p:cNvPr id="25" name="Текст 35">
             <a:extLst>
               <a:ext uri="{FF2B5EF4-FFF2-40B4-BE49-F238E27FC236}">
-                <a16:creationId xmlns:a16="http://schemas.microsoft.com/office/drawing/2014/main" xmlns="" id="{8BC2F90D-0CE0-574C-A7C1-EAA3E6F1AB56}"/>
+                <a16:creationId xmlns="" xmlns:a16="http://schemas.microsoft.com/office/drawing/2014/main" id="{8BC2F90D-0CE0-574C-A7C1-EAA3E6F1AB56}"/>
               </a:ext>
             </a:extLst>
           </p:cNvPr>
@@ -12669,7 +12669,7 @@
           <p:cNvPr id="26" name="Текст 35">
             <a:extLst>
               <a:ext uri="{FF2B5EF4-FFF2-40B4-BE49-F238E27FC236}">
-                <a16:creationId xmlns:a16="http://schemas.microsoft.com/office/drawing/2014/main" xmlns="" id="{239E188B-2696-8A48-9F8A-36223EEF61E9}"/>
+                <a16:creationId xmlns="" xmlns:a16="http://schemas.microsoft.com/office/drawing/2014/main" id="{239E188B-2696-8A48-9F8A-36223EEF61E9}"/>
               </a:ext>
             </a:extLst>
           </p:cNvPr>
@@ -12799,7 +12799,7 @@
           <p:cNvPr id="28" name="Текст 27">
             <a:extLst>
               <a:ext uri="{FF2B5EF4-FFF2-40B4-BE49-F238E27FC236}">
-                <a16:creationId xmlns:a16="http://schemas.microsoft.com/office/drawing/2014/main" xmlns="" id="{379BF4C6-F899-294C-B88E-8363AFBEEC2A}"/>
+                <a16:creationId xmlns="" xmlns:a16="http://schemas.microsoft.com/office/drawing/2014/main" id="{379BF4C6-F899-294C-B88E-8363AFBEEC2A}"/>
               </a:ext>
             </a:extLst>
           </p:cNvPr>
@@ -12871,7 +12871,7 @@
           <p:cNvPr id="29" name="Текст 27">
             <a:extLst>
               <a:ext uri="{FF2B5EF4-FFF2-40B4-BE49-F238E27FC236}">
-                <a16:creationId xmlns:a16="http://schemas.microsoft.com/office/drawing/2014/main" xmlns="" id="{DE7F352B-F6D9-B545-A835-443A55956E74}"/>
+                <a16:creationId xmlns="" xmlns:a16="http://schemas.microsoft.com/office/drawing/2014/main" id="{DE7F352B-F6D9-B545-A835-443A55956E74}"/>
               </a:ext>
             </a:extLst>
           </p:cNvPr>
@@ -12943,7 +12943,7 @@
           <p:cNvPr id="30" name="Текст 27">
             <a:extLst>
               <a:ext uri="{FF2B5EF4-FFF2-40B4-BE49-F238E27FC236}">
-                <a16:creationId xmlns:a16="http://schemas.microsoft.com/office/drawing/2014/main" xmlns="" id="{D1D5AF9F-C1B0-7842-8789-1DB8963D981B}"/>
+                <a16:creationId xmlns="" xmlns:a16="http://schemas.microsoft.com/office/drawing/2014/main" id="{D1D5AF9F-C1B0-7842-8789-1DB8963D981B}"/>
               </a:ext>
             </a:extLst>
           </p:cNvPr>
@@ -13015,7 +13015,7 @@
           <p:cNvPr id="18" name="Текст 37">
             <a:extLst>
               <a:ext uri="{FF2B5EF4-FFF2-40B4-BE49-F238E27FC236}">
-                <a16:creationId xmlns:a16="http://schemas.microsoft.com/office/drawing/2014/main" xmlns="" id="{37B4962B-A5BA-AB4F-AFB3-5BF3A0AD0352}"/>
+                <a16:creationId xmlns="" xmlns:a16="http://schemas.microsoft.com/office/drawing/2014/main" id="{37B4962B-A5BA-AB4F-AFB3-5BF3A0AD0352}"/>
               </a:ext>
             </a:extLst>
           </p:cNvPr>
@@ -13132,7 +13132,7 @@
           <p:cNvPr id="19" name="Текст 39">
             <a:extLst>
               <a:ext uri="{FF2B5EF4-FFF2-40B4-BE49-F238E27FC236}">
-                <a16:creationId xmlns:a16="http://schemas.microsoft.com/office/drawing/2014/main" xmlns="" id="{78AD85C2-6CFD-A94C-8134-2B3392A33196}"/>
+                <a16:creationId xmlns="" xmlns:a16="http://schemas.microsoft.com/office/drawing/2014/main" id="{78AD85C2-6CFD-A94C-8134-2B3392A33196}"/>
               </a:ext>
             </a:extLst>
           </p:cNvPr>
@@ -13239,7 +13239,7 @@
           <p:cNvPr id="20" name="Текст 39">
             <a:extLst>
               <a:ext uri="{FF2B5EF4-FFF2-40B4-BE49-F238E27FC236}">
-                <a16:creationId xmlns:a16="http://schemas.microsoft.com/office/drawing/2014/main" xmlns="" id="{C50CF571-E523-5440-B1C9-D74160206AED}"/>
+                <a16:creationId xmlns="" xmlns:a16="http://schemas.microsoft.com/office/drawing/2014/main" id="{C50CF571-E523-5440-B1C9-D74160206AED}"/>
               </a:ext>
             </a:extLst>
           </p:cNvPr>
@@ -13390,7 +13390,7 @@
           <p:cNvPr id="5" name="Picture 4" descr="Icon&#10;&#10;Description automatically generated">
             <a:extLst>
               <a:ext uri="{FF2B5EF4-FFF2-40B4-BE49-F238E27FC236}">
-                <a16:creationId xmlns:a16="http://schemas.microsoft.com/office/drawing/2014/main" xmlns="" id="{C5425806-16DD-844E-927C-26E7143A9ED8}"/>
+                <a16:creationId xmlns="" xmlns:a16="http://schemas.microsoft.com/office/drawing/2014/main" id="{C5425806-16DD-844E-927C-26E7143A9ED8}"/>
               </a:ext>
             </a:extLst>
           </p:cNvPr>
@@ -13420,7 +13420,7 @@
           <p:cNvPr id="6" name="Straight Connector 19">
             <a:extLst>
               <a:ext uri="{FF2B5EF4-FFF2-40B4-BE49-F238E27FC236}">
-                <a16:creationId xmlns:a16="http://schemas.microsoft.com/office/drawing/2014/main" xmlns="" id="{479746FF-3282-DF46-9D7C-D80431604A55}"/>
+                <a16:creationId xmlns="" xmlns:a16="http://schemas.microsoft.com/office/drawing/2014/main" id="{479746FF-3282-DF46-9D7C-D80431604A55}"/>
               </a:ext>
             </a:extLst>
           </p:cNvPr>
@@ -13463,7 +13463,7 @@
           <p:cNvPr id="7" name="Straight Connector 21">
             <a:extLst>
               <a:ext uri="{FF2B5EF4-FFF2-40B4-BE49-F238E27FC236}">
-                <a16:creationId xmlns:a16="http://schemas.microsoft.com/office/drawing/2014/main" xmlns="" id="{51B44297-B0E7-D74D-B291-D39A0D468B42}"/>
+                <a16:creationId xmlns="" xmlns:a16="http://schemas.microsoft.com/office/drawing/2014/main" id="{51B44297-B0E7-D74D-B291-D39A0D468B42}"/>
               </a:ext>
             </a:extLst>
           </p:cNvPr>
@@ -13506,7 +13506,7 @@
           <p:cNvPr id="8" name="Straight Connector 25">
             <a:extLst>
               <a:ext uri="{FF2B5EF4-FFF2-40B4-BE49-F238E27FC236}">
-                <a16:creationId xmlns:a16="http://schemas.microsoft.com/office/drawing/2014/main" xmlns="" id="{0EA4A057-F0CB-E04F-B472-4A1ABFB64C66}"/>
+                <a16:creationId xmlns="" xmlns:a16="http://schemas.microsoft.com/office/drawing/2014/main" id="{0EA4A057-F0CB-E04F-B472-4A1ABFB64C66}"/>
               </a:ext>
             </a:extLst>
           </p:cNvPr>
@@ -13549,7 +13549,7 @@
           <p:cNvPr id="9" name="TextBox 8">
             <a:extLst>
               <a:ext uri="{FF2B5EF4-FFF2-40B4-BE49-F238E27FC236}">
-                <a16:creationId xmlns:a16="http://schemas.microsoft.com/office/drawing/2014/main" xmlns="" id="{764502F5-56EE-354B-A3B1-E79F8B005172}"/>
+                <a16:creationId xmlns="" xmlns:a16="http://schemas.microsoft.com/office/drawing/2014/main" id="{764502F5-56EE-354B-A3B1-E79F8B005172}"/>
               </a:ext>
             </a:extLst>
           </p:cNvPr>
@@ -13595,7 +13595,7 @@
           <p:cNvPr id="10" name="Straight Connector 59">
             <a:extLst>
               <a:ext uri="{FF2B5EF4-FFF2-40B4-BE49-F238E27FC236}">
-                <a16:creationId xmlns:a16="http://schemas.microsoft.com/office/drawing/2014/main" xmlns="" id="{A80E0956-5C10-CC40-A426-CBD2E0C4158E}"/>
+                <a16:creationId xmlns="" xmlns:a16="http://schemas.microsoft.com/office/drawing/2014/main" id="{A80E0956-5C10-CC40-A426-CBD2E0C4158E}"/>
               </a:ext>
             </a:extLst>
           </p:cNvPr>
@@ -13638,7 +13638,7 @@
           <p:cNvPr id="15" name="Текст 22">
             <a:extLst>
               <a:ext uri="{FF2B5EF4-FFF2-40B4-BE49-F238E27FC236}">
-                <a16:creationId xmlns:a16="http://schemas.microsoft.com/office/drawing/2014/main" xmlns="" id="{51340CB4-0355-3640-A212-F684523CDCCF}"/>
+                <a16:creationId xmlns="" xmlns:a16="http://schemas.microsoft.com/office/drawing/2014/main" id="{51340CB4-0355-3640-A212-F684523CDCCF}"/>
               </a:ext>
             </a:extLst>
           </p:cNvPr>
@@ -13765,7 +13765,7 @@
           <p:cNvPr id="17" name="Текст 16">
             <a:extLst>
               <a:ext uri="{FF2B5EF4-FFF2-40B4-BE49-F238E27FC236}">
-                <a16:creationId xmlns:a16="http://schemas.microsoft.com/office/drawing/2014/main" xmlns="" id="{8C6F2EA4-CEDC-324C-9C06-8713118041EB}"/>
+                <a16:creationId xmlns="" xmlns:a16="http://schemas.microsoft.com/office/drawing/2014/main" id="{8C6F2EA4-CEDC-324C-9C06-8713118041EB}"/>
               </a:ext>
             </a:extLst>
           </p:cNvPr>
@@ -13892,7 +13892,7 @@
           <p:cNvPr id="19" name="Таблица 18">
             <a:extLst>
               <a:ext uri="{FF2B5EF4-FFF2-40B4-BE49-F238E27FC236}">
-                <a16:creationId xmlns:a16="http://schemas.microsoft.com/office/drawing/2014/main" xmlns="" id="{7B291085-A9B9-D842-B1A7-96258FAF012C}"/>
+                <a16:creationId xmlns="" xmlns:a16="http://schemas.microsoft.com/office/drawing/2014/main" id="{7B291085-A9B9-D842-B1A7-96258FAF012C}"/>
               </a:ext>
             </a:extLst>
           </p:cNvPr>
@@ -13925,7 +13925,7 @@
           <p:cNvPr id="16" name="Текст 37">
             <a:extLst>
               <a:ext uri="{FF2B5EF4-FFF2-40B4-BE49-F238E27FC236}">
-                <a16:creationId xmlns:a16="http://schemas.microsoft.com/office/drawing/2014/main" xmlns="" id="{252B365F-6D89-0045-99CC-0F0D3EF2DA0F}"/>
+                <a16:creationId xmlns="" xmlns:a16="http://schemas.microsoft.com/office/drawing/2014/main" id="{252B365F-6D89-0045-99CC-0F0D3EF2DA0F}"/>
               </a:ext>
             </a:extLst>
           </p:cNvPr>
@@ -14042,7 +14042,7 @@
           <p:cNvPr id="18" name="Текст 39">
             <a:extLst>
               <a:ext uri="{FF2B5EF4-FFF2-40B4-BE49-F238E27FC236}">
-                <a16:creationId xmlns:a16="http://schemas.microsoft.com/office/drawing/2014/main" xmlns="" id="{C9CC4AE0-EDCC-9A4F-97C4-4CAFF1F1EBCF}"/>
+                <a16:creationId xmlns="" xmlns:a16="http://schemas.microsoft.com/office/drawing/2014/main" id="{C9CC4AE0-EDCC-9A4F-97C4-4CAFF1F1EBCF}"/>
               </a:ext>
             </a:extLst>
           </p:cNvPr>
@@ -14149,7 +14149,7 @@
           <p:cNvPr id="20" name="Текст 39">
             <a:extLst>
               <a:ext uri="{FF2B5EF4-FFF2-40B4-BE49-F238E27FC236}">
-                <a16:creationId xmlns:a16="http://schemas.microsoft.com/office/drawing/2014/main" xmlns="" id="{185F6674-A1EC-1846-AEB5-DA4959807147}"/>
+                <a16:creationId xmlns="" xmlns:a16="http://schemas.microsoft.com/office/drawing/2014/main" id="{185F6674-A1EC-1846-AEB5-DA4959807147}"/>
               </a:ext>
             </a:extLst>
           </p:cNvPr>
@@ -14300,7 +14300,7 @@
           <p:cNvPr id="8" name="Picture 4" descr="Icon&#10;&#10;Description automatically generated">
             <a:extLst>
               <a:ext uri="{FF2B5EF4-FFF2-40B4-BE49-F238E27FC236}">
-                <a16:creationId xmlns:a16="http://schemas.microsoft.com/office/drawing/2014/main" xmlns="" id="{259ABC72-D738-1143-BF2A-D85AE9A4F73B}"/>
+                <a16:creationId xmlns="" xmlns:a16="http://schemas.microsoft.com/office/drawing/2014/main" id="{259ABC72-D738-1143-BF2A-D85AE9A4F73B}"/>
               </a:ext>
             </a:extLst>
           </p:cNvPr>
@@ -14330,7 +14330,7 @@
           <p:cNvPr id="9" name="Straight Connector 19">
             <a:extLst>
               <a:ext uri="{FF2B5EF4-FFF2-40B4-BE49-F238E27FC236}">
-                <a16:creationId xmlns:a16="http://schemas.microsoft.com/office/drawing/2014/main" xmlns="" id="{237A1E42-2FC3-8841-8C41-992C5BC2368D}"/>
+                <a16:creationId xmlns="" xmlns:a16="http://schemas.microsoft.com/office/drawing/2014/main" id="{237A1E42-2FC3-8841-8C41-992C5BC2368D}"/>
               </a:ext>
             </a:extLst>
           </p:cNvPr>
@@ -14373,7 +14373,7 @@
           <p:cNvPr id="10" name="Straight Connector 21">
             <a:extLst>
               <a:ext uri="{FF2B5EF4-FFF2-40B4-BE49-F238E27FC236}">
-                <a16:creationId xmlns:a16="http://schemas.microsoft.com/office/drawing/2014/main" xmlns="" id="{47503EA0-3883-E24D-9EB8-7B6175182929}"/>
+                <a16:creationId xmlns="" xmlns:a16="http://schemas.microsoft.com/office/drawing/2014/main" id="{47503EA0-3883-E24D-9EB8-7B6175182929}"/>
               </a:ext>
             </a:extLst>
           </p:cNvPr>
@@ -14416,7 +14416,7 @@
           <p:cNvPr id="11" name="Straight Connector 25">
             <a:extLst>
               <a:ext uri="{FF2B5EF4-FFF2-40B4-BE49-F238E27FC236}">
-                <a16:creationId xmlns:a16="http://schemas.microsoft.com/office/drawing/2014/main" xmlns="" id="{E0144DF2-9891-324D-B34E-AFA025FBCBF9}"/>
+                <a16:creationId xmlns="" xmlns:a16="http://schemas.microsoft.com/office/drawing/2014/main" id="{E0144DF2-9891-324D-B34E-AFA025FBCBF9}"/>
               </a:ext>
             </a:extLst>
           </p:cNvPr>
@@ -14459,7 +14459,7 @@
           <p:cNvPr id="12" name="TextBox 11">
             <a:extLst>
               <a:ext uri="{FF2B5EF4-FFF2-40B4-BE49-F238E27FC236}">
-                <a16:creationId xmlns:a16="http://schemas.microsoft.com/office/drawing/2014/main" xmlns="" id="{F33F65D6-1072-F140-B6A5-758D7B595A92}"/>
+                <a16:creationId xmlns="" xmlns:a16="http://schemas.microsoft.com/office/drawing/2014/main" id="{F33F65D6-1072-F140-B6A5-758D7B595A92}"/>
               </a:ext>
             </a:extLst>
           </p:cNvPr>
@@ -14505,7 +14505,7 @@
           <p:cNvPr id="13" name="Straight Connector 59">
             <a:extLst>
               <a:ext uri="{FF2B5EF4-FFF2-40B4-BE49-F238E27FC236}">
-                <a16:creationId xmlns:a16="http://schemas.microsoft.com/office/drawing/2014/main" xmlns="" id="{5F1F09D4-22FA-7B4B-9488-F8FDDCC2D447}"/>
+                <a16:creationId xmlns="" xmlns:a16="http://schemas.microsoft.com/office/drawing/2014/main" id="{5F1F09D4-22FA-7B4B-9488-F8FDDCC2D447}"/>
               </a:ext>
             </a:extLst>
           </p:cNvPr>
@@ -14548,7 +14548,7 @@
           <p:cNvPr id="18" name="Текст 22">
             <a:extLst>
               <a:ext uri="{FF2B5EF4-FFF2-40B4-BE49-F238E27FC236}">
-                <a16:creationId xmlns:a16="http://schemas.microsoft.com/office/drawing/2014/main" xmlns="" id="{4D940599-2B77-CE47-91E6-CDB51ADE1840}"/>
+                <a16:creationId xmlns="" xmlns:a16="http://schemas.microsoft.com/office/drawing/2014/main" id="{4D940599-2B77-CE47-91E6-CDB51ADE1840}"/>
               </a:ext>
             </a:extLst>
           </p:cNvPr>
@@ -14675,7 +14675,7 @@
           <p:cNvPr id="19" name="Текст 16">
             <a:extLst>
               <a:ext uri="{FF2B5EF4-FFF2-40B4-BE49-F238E27FC236}">
-                <a16:creationId xmlns:a16="http://schemas.microsoft.com/office/drawing/2014/main" xmlns="" id="{A7333712-9DED-4F4B-B209-2F13075EDB3F}"/>
+                <a16:creationId xmlns="" xmlns:a16="http://schemas.microsoft.com/office/drawing/2014/main" id="{A7333712-9DED-4F4B-B209-2F13075EDB3F}"/>
               </a:ext>
             </a:extLst>
           </p:cNvPr>
@@ -14802,7 +14802,7 @@
           <p:cNvPr id="20" name="Таблица 18">
             <a:extLst>
               <a:ext uri="{FF2B5EF4-FFF2-40B4-BE49-F238E27FC236}">
-                <a16:creationId xmlns:a16="http://schemas.microsoft.com/office/drawing/2014/main" xmlns="" id="{DD467C42-8209-B740-8419-DBB6A6F7D5EE}"/>
+                <a16:creationId xmlns="" xmlns:a16="http://schemas.microsoft.com/office/drawing/2014/main" id="{DD467C42-8209-B740-8419-DBB6A6F7D5EE}"/>
               </a:ext>
             </a:extLst>
           </p:cNvPr>
@@ -14835,7 +14835,7 @@
           <p:cNvPr id="21" name="Текст 35">
             <a:extLst>
               <a:ext uri="{FF2B5EF4-FFF2-40B4-BE49-F238E27FC236}">
-                <a16:creationId xmlns:a16="http://schemas.microsoft.com/office/drawing/2014/main" xmlns="" id="{B4309850-76EA-224C-A9E2-B6BBDBF99DE2}"/>
+                <a16:creationId xmlns="" xmlns:a16="http://schemas.microsoft.com/office/drawing/2014/main" id="{B4309850-76EA-224C-A9E2-B6BBDBF99DE2}"/>
               </a:ext>
             </a:extLst>
           </p:cNvPr>
@@ -15517,7 +15517,7 @@
           <p:cNvPr id="16" name="Текст 37">
             <a:extLst>
               <a:ext uri="{FF2B5EF4-FFF2-40B4-BE49-F238E27FC236}">
-                <a16:creationId xmlns:a16="http://schemas.microsoft.com/office/drawing/2014/main" xmlns="" id="{6809E15B-CD0E-2F47-B500-B457A9CCBB37}"/>
+                <a16:creationId xmlns="" xmlns:a16="http://schemas.microsoft.com/office/drawing/2014/main" id="{6809E15B-CD0E-2F47-B500-B457A9CCBB37}"/>
               </a:ext>
             </a:extLst>
           </p:cNvPr>
@@ -15634,7 +15634,7 @@
           <p:cNvPr id="22" name="Текст 39">
             <a:extLst>
               <a:ext uri="{FF2B5EF4-FFF2-40B4-BE49-F238E27FC236}">
-                <a16:creationId xmlns:a16="http://schemas.microsoft.com/office/drawing/2014/main" xmlns="" id="{7E0B9771-35DC-D24C-B598-648DE6F8DE64}"/>
+                <a16:creationId xmlns="" xmlns:a16="http://schemas.microsoft.com/office/drawing/2014/main" id="{7E0B9771-35DC-D24C-B598-648DE6F8DE64}"/>
               </a:ext>
             </a:extLst>
           </p:cNvPr>
@@ -15741,7 +15741,7 @@
           <p:cNvPr id="23" name="Текст 39">
             <a:extLst>
               <a:ext uri="{FF2B5EF4-FFF2-40B4-BE49-F238E27FC236}">
-                <a16:creationId xmlns:a16="http://schemas.microsoft.com/office/drawing/2014/main" xmlns="" id="{5B1ACD18-BD14-2B4B-BA0A-46A5167E2C75}"/>
+                <a16:creationId xmlns="" xmlns:a16="http://schemas.microsoft.com/office/drawing/2014/main" id="{5B1ACD18-BD14-2B4B-BA0A-46A5167E2C75}"/>
               </a:ext>
             </a:extLst>
           </p:cNvPr>
@@ -16205,7 +16205,7 @@
           <p:cNvPr id="2" name="Заголовок 1">
             <a:extLst>
               <a:ext uri="{FF2B5EF4-FFF2-40B4-BE49-F238E27FC236}">
-                <a16:creationId xmlns:a16="http://schemas.microsoft.com/office/drawing/2014/main" xmlns="" id="{98757A51-BBC2-9047-B199-AE90EB17B4D4}"/>
+                <a16:creationId xmlns="" xmlns:a16="http://schemas.microsoft.com/office/drawing/2014/main" id="{98757A51-BBC2-9047-B199-AE90EB17B4D4}"/>
               </a:ext>
             </a:extLst>
           </p:cNvPr>
@@ -16254,7 +16254,7 @@
           <p:cNvPr id="3" name="Текст 2">
             <a:extLst>
               <a:ext uri="{FF2B5EF4-FFF2-40B4-BE49-F238E27FC236}">
-                <a16:creationId xmlns:a16="http://schemas.microsoft.com/office/drawing/2014/main" xmlns="" id="{268EB560-A246-394A-858C-3B1CFBF03B46}"/>
+                <a16:creationId xmlns="" xmlns:a16="http://schemas.microsoft.com/office/drawing/2014/main" id="{268EB560-A246-394A-858C-3B1CFBF03B46}"/>
               </a:ext>
             </a:extLst>
           </p:cNvPr>
@@ -16297,7 +16297,7 @@
           <p:cNvPr id="4" name="Текст 3">
             <a:extLst>
               <a:ext uri="{FF2B5EF4-FFF2-40B4-BE49-F238E27FC236}">
-                <a16:creationId xmlns:a16="http://schemas.microsoft.com/office/drawing/2014/main" xmlns="" id="{83B3283F-BF0F-3744-BA57-1A19F8F76332}"/>
+                <a16:creationId xmlns="" xmlns:a16="http://schemas.microsoft.com/office/drawing/2014/main" id="{83B3283F-BF0F-3744-BA57-1A19F8F76332}"/>
               </a:ext>
             </a:extLst>
           </p:cNvPr>
@@ -16335,7 +16335,7 @@
           <p:cNvPr id="5" name="Текст 4">
             <a:extLst>
               <a:ext uri="{FF2B5EF4-FFF2-40B4-BE49-F238E27FC236}">
-                <a16:creationId xmlns:a16="http://schemas.microsoft.com/office/drawing/2014/main" xmlns="" id="{CC6432FC-CD29-4D47-A915-D2737E0BEA33}"/>
+                <a16:creationId xmlns="" xmlns:a16="http://schemas.microsoft.com/office/drawing/2014/main" id="{CC6432FC-CD29-4D47-A915-D2737E0BEA33}"/>
               </a:ext>
             </a:extLst>
           </p:cNvPr>
@@ -16370,7 +16370,7 @@
           <p:cNvPr id="6" name="Текст 5">
             <a:extLst>
               <a:ext uri="{FF2B5EF4-FFF2-40B4-BE49-F238E27FC236}">
-                <a16:creationId xmlns:a16="http://schemas.microsoft.com/office/drawing/2014/main" xmlns="" id="{B32B7800-48A3-394E-A464-7BA3AE15CECB}"/>
+                <a16:creationId xmlns="" xmlns:a16="http://schemas.microsoft.com/office/drawing/2014/main" id="{B32B7800-48A3-394E-A464-7BA3AE15CECB}"/>
               </a:ext>
             </a:extLst>
           </p:cNvPr>
@@ -16499,7 +16499,7 @@
           <p:cNvPr id="2" name="Заголовок 1">
             <a:extLst>
               <a:ext uri="{FF2B5EF4-FFF2-40B4-BE49-F238E27FC236}">
-                <a16:creationId xmlns:a16="http://schemas.microsoft.com/office/drawing/2014/main" xmlns="" id="{075A9635-3750-D34A-AC4F-18C777EEEACE}"/>
+                <a16:creationId xmlns="" xmlns:a16="http://schemas.microsoft.com/office/drawing/2014/main" id="{075A9635-3750-D34A-AC4F-18C777EEEACE}"/>
               </a:ext>
             </a:extLst>
           </p:cNvPr>
@@ -16544,7 +16544,7 @@
           <p:cNvPr id="3" name="Текст 2">
             <a:extLst>
               <a:ext uri="{FF2B5EF4-FFF2-40B4-BE49-F238E27FC236}">
-                <a16:creationId xmlns:a16="http://schemas.microsoft.com/office/drawing/2014/main" xmlns="" id="{DC07A214-5C62-A748-9610-9B102D55042C}"/>
+                <a16:creationId xmlns="" xmlns:a16="http://schemas.microsoft.com/office/drawing/2014/main" id="{DC07A214-5C62-A748-9610-9B102D55042C}"/>
               </a:ext>
             </a:extLst>
           </p:cNvPr>
@@ -16627,7 +16627,7 @@
           <p:cNvPr id="4" name="Текст 3">
             <a:extLst>
               <a:ext uri="{FF2B5EF4-FFF2-40B4-BE49-F238E27FC236}">
-                <a16:creationId xmlns:a16="http://schemas.microsoft.com/office/drawing/2014/main" xmlns="" id="{479F1503-6AC3-BC44-8339-CDF4434C29F8}"/>
+                <a16:creationId xmlns="" xmlns:a16="http://schemas.microsoft.com/office/drawing/2014/main" id="{479F1503-6AC3-BC44-8339-CDF4434C29F8}"/>
               </a:ext>
             </a:extLst>
           </p:cNvPr>
@@ -16664,7 +16664,7 @@
           <p:cNvPr id="5" name="Текст 4">
             <a:extLst>
               <a:ext uri="{FF2B5EF4-FFF2-40B4-BE49-F238E27FC236}">
-                <a16:creationId xmlns:a16="http://schemas.microsoft.com/office/drawing/2014/main" xmlns="" id="{B44726F6-6B97-9541-B430-5890C40AB653}"/>
+                <a16:creationId xmlns="" xmlns:a16="http://schemas.microsoft.com/office/drawing/2014/main" id="{B44726F6-6B97-9541-B430-5890C40AB653}"/>
               </a:ext>
             </a:extLst>
           </p:cNvPr>
@@ -16712,7 +16712,7 @@
           <p:cNvPr id="6" name="Текст 5">
             <a:extLst>
               <a:ext uri="{FF2B5EF4-FFF2-40B4-BE49-F238E27FC236}">
-                <a16:creationId xmlns:a16="http://schemas.microsoft.com/office/drawing/2014/main" xmlns="" id="{1FF1B796-D346-7747-8C68-5B56E6538039}"/>
+                <a16:creationId xmlns="" xmlns:a16="http://schemas.microsoft.com/office/drawing/2014/main" id="{1FF1B796-D346-7747-8C68-5B56E6538039}"/>
               </a:ext>
             </a:extLst>
           </p:cNvPr>
@@ -16829,7 +16829,7 @@
           <p:cNvPr id="2" name="Заголовок 1">
             <a:extLst>
               <a:ext uri="{FF2B5EF4-FFF2-40B4-BE49-F238E27FC236}">
-                <a16:creationId xmlns:a16="http://schemas.microsoft.com/office/drawing/2014/main" xmlns="" id="{4F0FBB06-E150-E043-9C3B-E94A0F5A67CA}"/>
+                <a16:creationId xmlns="" xmlns:a16="http://schemas.microsoft.com/office/drawing/2014/main" id="{4F0FBB06-E150-E043-9C3B-E94A0F5A67CA}"/>
               </a:ext>
             </a:extLst>
           </p:cNvPr>
@@ -16878,7 +16878,7 @@
           <p:cNvPr id="3" name="Текст 2">
             <a:extLst>
               <a:ext uri="{FF2B5EF4-FFF2-40B4-BE49-F238E27FC236}">
-                <a16:creationId xmlns:a16="http://schemas.microsoft.com/office/drawing/2014/main" xmlns="" id="{2465E442-B2F4-3748-B83F-E8D7BCF1B778}"/>
+                <a16:creationId xmlns="" xmlns:a16="http://schemas.microsoft.com/office/drawing/2014/main" id="{2465E442-B2F4-3748-B83F-E8D7BCF1B778}"/>
               </a:ext>
             </a:extLst>
           </p:cNvPr>
@@ -16976,7 +16976,15 @@
             </a:r>
             <a:r>
               <a:rPr lang="en-US" dirty="0"/>
-              <a:t>that have a lot of unexpected </a:t>
+              <a:t>that </a:t>
+            </a:r>
+            <a:r>
+              <a:rPr lang="en-US" dirty="0" smtClean="0"/>
+              <a:t>has </a:t>
+            </a:r>
+            <a:r>
+              <a:rPr lang="en-US" dirty="0"/>
+              <a:t>a lot of unexpected </a:t>
             </a:r>
             <a:r>
               <a:rPr lang="en-US" dirty="0" smtClean="0"/>
@@ -17000,7 +17008,7 @@
           <p:cNvPr id="6" name="Текст 5">
             <a:extLst>
               <a:ext uri="{FF2B5EF4-FFF2-40B4-BE49-F238E27FC236}">
-                <a16:creationId xmlns:a16="http://schemas.microsoft.com/office/drawing/2014/main" xmlns="" id="{76992545-046C-7241-A3FF-215D81AF4AB3}"/>
+                <a16:creationId xmlns="" xmlns:a16="http://schemas.microsoft.com/office/drawing/2014/main" id="{76992545-046C-7241-A3FF-215D81AF4AB3}"/>
               </a:ext>
             </a:extLst>
           </p:cNvPr>
@@ -17037,7 +17045,7 @@
           <p:cNvPr id="7" name="Текст 6">
             <a:extLst>
               <a:ext uri="{FF2B5EF4-FFF2-40B4-BE49-F238E27FC236}">
-                <a16:creationId xmlns:a16="http://schemas.microsoft.com/office/drawing/2014/main" xmlns="" id="{31A0EB17-0D28-524C-9C34-1970B0BAC8CE}"/>
+                <a16:creationId xmlns="" xmlns:a16="http://schemas.microsoft.com/office/drawing/2014/main" id="{31A0EB17-0D28-524C-9C34-1970B0BAC8CE}"/>
               </a:ext>
             </a:extLst>
           </p:cNvPr>
@@ -17085,7 +17093,7 @@
           <p:cNvPr id="8" name="Текст 7">
             <a:extLst>
               <a:ext uri="{FF2B5EF4-FFF2-40B4-BE49-F238E27FC236}">
-                <a16:creationId xmlns:a16="http://schemas.microsoft.com/office/drawing/2014/main" xmlns="" id="{CD633F9A-0684-3C45-AC7F-6A087C1D8F06}"/>
+                <a16:creationId xmlns="" xmlns:a16="http://schemas.microsoft.com/office/drawing/2014/main" id="{CD633F9A-0684-3C45-AC7F-6A087C1D8F06}"/>
               </a:ext>
             </a:extLst>
           </p:cNvPr>
@@ -17199,7 +17207,7 @@
           <p:cNvPr id="2" name="Текст 1">
             <a:extLst>
               <a:ext uri="{FF2B5EF4-FFF2-40B4-BE49-F238E27FC236}">
-                <a16:creationId xmlns:a16="http://schemas.microsoft.com/office/drawing/2014/main" xmlns="" id="{92EB013E-243A-7E44-84B3-4118CCD5AFF9}"/>
+                <a16:creationId xmlns="" xmlns:a16="http://schemas.microsoft.com/office/drawing/2014/main" id="{92EB013E-243A-7E44-84B3-4118CCD5AFF9}"/>
               </a:ext>
             </a:extLst>
           </p:cNvPr>
@@ -17236,7 +17244,7 @@
           <p:cNvPr id="3" name="Текст 2">
             <a:extLst>
               <a:ext uri="{FF2B5EF4-FFF2-40B4-BE49-F238E27FC236}">
-                <a16:creationId xmlns:a16="http://schemas.microsoft.com/office/drawing/2014/main" xmlns="" id="{7D323C45-B329-894C-9560-43EF3302210E}"/>
+                <a16:creationId xmlns="" xmlns:a16="http://schemas.microsoft.com/office/drawing/2014/main" id="{7D323C45-B329-894C-9560-43EF3302210E}"/>
               </a:ext>
             </a:extLst>
           </p:cNvPr>
@@ -17284,7 +17292,7 @@
           <p:cNvPr id="4" name="Текст 3">
             <a:extLst>
               <a:ext uri="{FF2B5EF4-FFF2-40B4-BE49-F238E27FC236}">
-                <a16:creationId xmlns:a16="http://schemas.microsoft.com/office/drawing/2014/main" xmlns="" id="{0ADA81B8-0209-EA4C-8306-5853CB70BEE8}"/>
+                <a16:creationId xmlns="" xmlns:a16="http://schemas.microsoft.com/office/drawing/2014/main" id="{0ADA81B8-0209-EA4C-8306-5853CB70BEE8}"/>
               </a:ext>
             </a:extLst>
           </p:cNvPr>
@@ -17323,7 +17331,7 @@
           <p:cNvPr id="5" name="Заголовок 1">
             <a:extLst>
               <a:ext uri="{FF2B5EF4-FFF2-40B4-BE49-F238E27FC236}">
-                <a16:creationId xmlns:a16="http://schemas.microsoft.com/office/drawing/2014/main" xmlns="" id="{98757A51-BBC2-9047-B199-AE90EB17B4D4}"/>
+                <a16:creationId xmlns="" xmlns:a16="http://schemas.microsoft.com/office/drawing/2014/main" id="{98757A51-BBC2-9047-B199-AE90EB17B4D4}"/>
               </a:ext>
             </a:extLst>
           </p:cNvPr>
@@ -17372,16 +17380,10 @@
           </a:p>
           <a:p>
             <a:r>
-              <a:rPr lang="en-US" sz="4300" dirty="0">
-                <a:latin typeface="HSE Sans"/>
-              </a:rPr>
-              <a:t>I am </a:t>
-            </a:r>
-            <a:r>
               <a:rPr lang="en-US" sz="4300" dirty="0" smtClean="0">
                 <a:latin typeface="HSE Sans"/>
               </a:rPr>
-              <a:t>glad </a:t>
+              <a:t>I’ll be glad </a:t>
             </a:r>
             <a:r>
               <a:rPr lang="en-US" sz="4300" dirty="0">
@@ -17445,7 +17447,7 @@
           <p:cNvPr id="3" name="Заголовок 2">
             <a:extLst>
               <a:ext uri="{FF2B5EF4-FFF2-40B4-BE49-F238E27FC236}">
-                <a16:creationId xmlns:a16="http://schemas.microsoft.com/office/drawing/2014/main" xmlns="" id="{8219D05C-99A7-9C48-B903-118CF3BA60CA}"/>
+                <a16:creationId xmlns="" xmlns:a16="http://schemas.microsoft.com/office/drawing/2014/main" id="{8219D05C-99A7-9C48-B903-118CF3BA60CA}"/>
               </a:ext>
             </a:extLst>
           </p:cNvPr>
@@ -17485,7 +17487,7 @@
           <p:cNvPr id="4" name="Текст 3">
             <a:extLst>
               <a:ext uri="{FF2B5EF4-FFF2-40B4-BE49-F238E27FC236}">
-                <a16:creationId xmlns:a16="http://schemas.microsoft.com/office/drawing/2014/main" xmlns="" id="{985EFA28-570A-F647-B2F7-A43359726B4F}"/>
+                <a16:creationId xmlns="" xmlns:a16="http://schemas.microsoft.com/office/drawing/2014/main" id="{985EFA28-570A-F647-B2F7-A43359726B4F}"/>
               </a:ext>
             </a:extLst>
           </p:cNvPr>
@@ -17709,7 +17711,7 @@
           <p:cNvPr id="5" name="Текст 4">
             <a:extLst>
               <a:ext uri="{FF2B5EF4-FFF2-40B4-BE49-F238E27FC236}">
-                <a16:creationId xmlns:a16="http://schemas.microsoft.com/office/drawing/2014/main" xmlns="" id="{C612FDF3-830C-8745-A254-C8DF29B6C387}"/>
+                <a16:creationId xmlns="" xmlns:a16="http://schemas.microsoft.com/office/drawing/2014/main" id="{C612FDF3-830C-8745-A254-C8DF29B6C387}"/>
               </a:ext>
             </a:extLst>
           </p:cNvPr>
@@ -17746,7 +17748,7 @@
           <p:cNvPr id="6" name="Текст 5">
             <a:extLst>
               <a:ext uri="{FF2B5EF4-FFF2-40B4-BE49-F238E27FC236}">
-                <a16:creationId xmlns:a16="http://schemas.microsoft.com/office/drawing/2014/main" xmlns="" id="{40682799-9A38-414D-BD10-45C11B66347C}"/>
+                <a16:creationId xmlns="" xmlns:a16="http://schemas.microsoft.com/office/drawing/2014/main" id="{40682799-9A38-414D-BD10-45C11B66347C}"/>
               </a:ext>
             </a:extLst>
           </p:cNvPr>
@@ -17794,7 +17796,7 @@
           <p:cNvPr id="7" name="Текст 6">
             <a:extLst>
               <a:ext uri="{FF2B5EF4-FFF2-40B4-BE49-F238E27FC236}">
-                <a16:creationId xmlns:a16="http://schemas.microsoft.com/office/drawing/2014/main" xmlns="" id="{35F411B5-8431-CE4A-BEA6-775367101901}"/>
+                <a16:creationId xmlns="" xmlns:a16="http://schemas.microsoft.com/office/drawing/2014/main" id="{35F411B5-8431-CE4A-BEA6-775367101901}"/>
               </a:ext>
             </a:extLst>
           </p:cNvPr>
@@ -17946,7 +17948,7 @@
           <p:cNvPr id="3" name="Заголовок 2">
             <a:extLst>
               <a:ext uri="{FF2B5EF4-FFF2-40B4-BE49-F238E27FC236}">
-                <a16:creationId xmlns:a16="http://schemas.microsoft.com/office/drawing/2014/main" xmlns="" id="{8219D05C-99A7-9C48-B903-118CF3BA60CA}"/>
+                <a16:creationId xmlns="" xmlns:a16="http://schemas.microsoft.com/office/drawing/2014/main" id="{8219D05C-99A7-9C48-B903-118CF3BA60CA}"/>
               </a:ext>
             </a:extLst>
           </p:cNvPr>
@@ -17990,7 +17992,7 @@
           <p:cNvPr id="4" name="Текст 3">
             <a:extLst>
               <a:ext uri="{FF2B5EF4-FFF2-40B4-BE49-F238E27FC236}">
-                <a16:creationId xmlns:a16="http://schemas.microsoft.com/office/drawing/2014/main" xmlns="" id="{985EFA28-570A-F647-B2F7-A43359726B4F}"/>
+                <a16:creationId xmlns="" xmlns:a16="http://schemas.microsoft.com/office/drawing/2014/main" id="{985EFA28-570A-F647-B2F7-A43359726B4F}"/>
               </a:ext>
             </a:extLst>
           </p:cNvPr>
@@ -18024,7 +18026,19 @@
             </a:r>
             <a:r>
               <a:rPr lang="en-US" dirty="0"/>
-              <a:t>) is an area of machine learning concerned with how intelligent agents ought to take actions in an environment in order to maximize the notion of cumulative reward</a:t>
+              <a:t>) is an area of machine learning</a:t>
+            </a:r>
+            <a:r>
+              <a:rPr lang="en-US"/>
+              <a:t> </a:t>
+            </a:r>
+            <a:r>
+              <a:rPr lang="en-US" smtClean="0"/>
+              <a:t>connected with </a:t>
+            </a:r>
+            <a:r>
+              <a:rPr lang="en-US" dirty="0"/>
+              <a:t>how intelligent agents ought to take actions in an environment in order to maximize the notion of cumulative reward</a:t>
             </a:r>
             <a:r>
               <a:rPr lang="en-US" dirty="0" smtClean="0"/>
@@ -18099,7 +18113,7 @@
           <p:cNvPr id="5" name="Текст 4">
             <a:extLst>
               <a:ext uri="{FF2B5EF4-FFF2-40B4-BE49-F238E27FC236}">
-                <a16:creationId xmlns:a16="http://schemas.microsoft.com/office/drawing/2014/main" xmlns="" id="{C612FDF3-830C-8745-A254-C8DF29B6C387}"/>
+                <a16:creationId xmlns="" xmlns:a16="http://schemas.microsoft.com/office/drawing/2014/main" id="{C612FDF3-830C-8745-A254-C8DF29B6C387}"/>
               </a:ext>
             </a:extLst>
           </p:cNvPr>
@@ -18136,7 +18150,7 @@
           <p:cNvPr id="6" name="Текст 5">
             <a:extLst>
               <a:ext uri="{FF2B5EF4-FFF2-40B4-BE49-F238E27FC236}">
-                <a16:creationId xmlns:a16="http://schemas.microsoft.com/office/drawing/2014/main" xmlns="" id="{40682799-9A38-414D-BD10-45C11B66347C}"/>
+                <a16:creationId xmlns="" xmlns:a16="http://schemas.microsoft.com/office/drawing/2014/main" id="{40682799-9A38-414D-BD10-45C11B66347C}"/>
               </a:ext>
             </a:extLst>
           </p:cNvPr>
@@ -18184,7 +18198,7 @@
           <p:cNvPr id="7" name="Текст 6">
             <a:extLst>
               <a:ext uri="{FF2B5EF4-FFF2-40B4-BE49-F238E27FC236}">
-                <a16:creationId xmlns:a16="http://schemas.microsoft.com/office/drawing/2014/main" xmlns="" id="{35F411B5-8431-CE4A-BEA6-775367101901}"/>
+                <a16:creationId xmlns="" xmlns:a16="http://schemas.microsoft.com/office/drawing/2014/main" id="{35F411B5-8431-CE4A-BEA6-775367101901}"/>
               </a:ext>
             </a:extLst>
           </p:cNvPr>
@@ -18256,7 +18270,7 @@
           <p:cNvPr id="14" name="Заголовок 13">
             <a:extLst>
               <a:ext uri="{FF2B5EF4-FFF2-40B4-BE49-F238E27FC236}">
-                <a16:creationId xmlns:a16="http://schemas.microsoft.com/office/drawing/2014/main" xmlns="" id="{C1657578-5B49-FB42-9E68-EF4E3D607FF9}"/>
+                <a16:creationId xmlns="" xmlns:a16="http://schemas.microsoft.com/office/drawing/2014/main" id="{C1657578-5B49-FB42-9E68-EF4E3D607FF9}"/>
               </a:ext>
             </a:extLst>
           </p:cNvPr>
@@ -18313,7 +18327,7 @@
           <p:cNvPr id="16" name="Текст 15">
             <a:extLst>
               <a:ext uri="{FF2B5EF4-FFF2-40B4-BE49-F238E27FC236}">
-                <a16:creationId xmlns:a16="http://schemas.microsoft.com/office/drawing/2014/main" xmlns="" id="{50D06A58-9783-744B-8ED5-A490C825F5D6}"/>
+                <a16:creationId xmlns="" xmlns:a16="http://schemas.microsoft.com/office/drawing/2014/main" id="{50D06A58-9783-744B-8ED5-A490C825F5D6}"/>
               </a:ext>
             </a:extLst>
           </p:cNvPr>
@@ -18357,7 +18371,11 @@
           <a:p>
             <a:r>
               <a:rPr lang="en-US" dirty="0" smtClean="0"/>
-              <a:t>Purpose for me:</a:t>
+              <a:t>My own purpose:</a:t>
+            </a:r>
+            <a:r>
+              <a:rPr lang="en-US" dirty="0" smtClean="0"/>
+              <a:t/>
             </a:r>
             <a:br>
               <a:rPr lang="en-US" dirty="0" smtClean="0"/>
@@ -18368,7 +18386,11 @@
             </a:r>
             <a:r>
               <a:rPr lang="en-US" dirty="0"/>
-              <a:t>more about neural networks, learn how to use them</a:t>
+              <a:t>more about neural networks, learn how to use </a:t>
+            </a:r>
+            <a:r>
+              <a:rPr lang="en-US" dirty="0" smtClean="0"/>
+              <a:t>them.</a:t>
             </a:r>
             <a:endParaRPr lang="ru-RU" dirty="0"/>
           </a:p>
@@ -18379,7 +18401,7 @@
           <p:cNvPr id="17" name="Текст 16">
             <a:extLst>
               <a:ext uri="{FF2B5EF4-FFF2-40B4-BE49-F238E27FC236}">
-                <a16:creationId xmlns:a16="http://schemas.microsoft.com/office/drawing/2014/main" xmlns="" id="{12BD20DF-BD74-4B4E-BFCB-0201711B214C}"/>
+                <a16:creationId xmlns="" xmlns:a16="http://schemas.microsoft.com/office/drawing/2014/main" id="{12BD20DF-BD74-4B4E-BFCB-0201711B214C}"/>
               </a:ext>
             </a:extLst>
           </p:cNvPr>
@@ -18416,7 +18438,7 @@
           <p:cNvPr id="18" name="Текст 17">
             <a:extLst>
               <a:ext uri="{FF2B5EF4-FFF2-40B4-BE49-F238E27FC236}">
-                <a16:creationId xmlns:a16="http://schemas.microsoft.com/office/drawing/2014/main" xmlns="" id="{AB20B420-8F92-714B-B774-4CCFF071FC96}"/>
+                <a16:creationId xmlns="" xmlns:a16="http://schemas.microsoft.com/office/drawing/2014/main" id="{AB20B420-8F92-714B-B774-4CCFF071FC96}"/>
               </a:ext>
             </a:extLst>
           </p:cNvPr>
@@ -18464,7 +18486,7 @@
           <p:cNvPr id="19" name="Текст 18">
             <a:extLst>
               <a:ext uri="{FF2B5EF4-FFF2-40B4-BE49-F238E27FC236}">
-                <a16:creationId xmlns:a16="http://schemas.microsoft.com/office/drawing/2014/main" xmlns="" id="{E28F3689-1426-FC44-97DB-4AC538FC64CC}"/>
+                <a16:creationId xmlns="" xmlns:a16="http://schemas.microsoft.com/office/drawing/2014/main" id="{E28F3689-1426-FC44-97DB-4AC538FC64CC}"/>
               </a:ext>
             </a:extLst>
           </p:cNvPr>
@@ -18586,7 +18608,7 @@
           <p:cNvPr id="2" name="Текст 1">
             <a:extLst>
               <a:ext uri="{FF2B5EF4-FFF2-40B4-BE49-F238E27FC236}">
-                <a16:creationId xmlns:a16="http://schemas.microsoft.com/office/drawing/2014/main" xmlns="" id="{31CADBA8-95D9-8D40-BF8A-D246040A1BCC}"/>
+                <a16:creationId xmlns="" xmlns:a16="http://schemas.microsoft.com/office/drawing/2014/main" id="{31CADBA8-95D9-8D40-BF8A-D246040A1BCC}"/>
               </a:ext>
             </a:extLst>
           </p:cNvPr>
@@ -18694,7 +18716,7 @@
           <p:cNvPr id="4" name="Текст 3">
             <a:extLst>
               <a:ext uri="{FF2B5EF4-FFF2-40B4-BE49-F238E27FC236}">
-                <a16:creationId xmlns:a16="http://schemas.microsoft.com/office/drawing/2014/main" xmlns="" id="{35248FDE-0E1E-FE42-AA26-67AD51F2AF02}"/>
+                <a16:creationId xmlns="" xmlns:a16="http://schemas.microsoft.com/office/drawing/2014/main" id="{35248FDE-0E1E-FE42-AA26-67AD51F2AF02}"/>
               </a:ext>
             </a:extLst>
           </p:cNvPr>
@@ -18737,7 +18759,7 @@
           <p:cNvPr id="5" name="Текст 4">
             <a:extLst>
               <a:ext uri="{FF2B5EF4-FFF2-40B4-BE49-F238E27FC236}">
-                <a16:creationId xmlns:a16="http://schemas.microsoft.com/office/drawing/2014/main" xmlns="" id="{53463A2E-711B-0B4E-ABC0-1C3B01B412F6}"/>
+                <a16:creationId xmlns="" xmlns:a16="http://schemas.microsoft.com/office/drawing/2014/main" id="{53463A2E-711B-0B4E-ABC0-1C3B01B412F6}"/>
               </a:ext>
             </a:extLst>
           </p:cNvPr>
@@ -18818,7 +18840,7 @@
           <p:cNvPr id="6" name="Текст 5">
             <a:extLst>
               <a:ext uri="{FF2B5EF4-FFF2-40B4-BE49-F238E27FC236}">
-                <a16:creationId xmlns:a16="http://schemas.microsoft.com/office/drawing/2014/main" xmlns="" id="{D3194695-389E-EF40-9EB6-192AF89531C5}"/>
+                <a16:creationId xmlns="" xmlns:a16="http://schemas.microsoft.com/office/drawing/2014/main" id="{D3194695-389E-EF40-9EB6-192AF89531C5}"/>
               </a:ext>
             </a:extLst>
           </p:cNvPr>
@@ -18855,7 +18877,7 @@
           <p:cNvPr id="7" name="Текст 6">
             <a:extLst>
               <a:ext uri="{FF2B5EF4-FFF2-40B4-BE49-F238E27FC236}">
-                <a16:creationId xmlns:a16="http://schemas.microsoft.com/office/drawing/2014/main" xmlns="" id="{E1A17EF3-80FC-E949-9D29-35399B3E471A}"/>
+                <a16:creationId xmlns="" xmlns:a16="http://schemas.microsoft.com/office/drawing/2014/main" id="{E1A17EF3-80FC-E949-9D29-35399B3E471A}"/>
               </a:ext>
             </a:extLst>
           </p:cNvPr>
@@ -18903,7 +18925,7 @@
           <p:cNvPr id="8" name="Текст 7">
             <a:extLst>
               <a:ext uri="{FF2B5EF4-FFF2-40B4-BE49-F238E27FC236}">
-                <a16:creationId xmlns:a16="http://schemas.microsoft.com/office/drawing/2014/main" xmlns="" id="{8ED3F895-1E75-1241-8B43-5C46931114A0}"/>
+                <a16:creationId xmlns="" xmlns:a16="http://schemas.microsoft.com/office/drawing/2014/main" id="{8ED3F895-1E75-1241-8B43-5C46931114A0}"/>
               </a:ext>
             </a:extLst>
           </p:cNvPr>
@@ -18947,7 +18969,7 @@
           <p:cNvPr id="9" name="Chart 1">
             <a:extLst>
               <a:ext uri="{FF2B5EF4-FFF2-40B4-BE49-F238E27FC236}">
-                <a16:creationId xmlns:a16="http://schemas.microsoft.com/office/drawing/2014/main" xmlns="" id="{14949F48-42A1-3A41-BECB-1BA0E21C291A}"/>
+                <a16:creationId xmlns="" xmlns:a16="http://schemas.microsoft.com/office/drawing/2014/main" id="{14949F48-42A1-3A41-BECB-1BA0E21C291A}"/>
               </a:ext>
             </a:extLst>
           </p:cNvPr>
@@ -19012,7 +19034,7 @@
           <p:cNvPr id="2" name="Заголовок 1">
             <a:extLst>
               <a:ext uri="{FF2B5EF4-FFF2-40B4-BE49-F238E27FC236}">
-                <a16:creationId xmlns:a16="http://schemas.microsoft.com/office/drawing/2014/main" xmlns="" id="{067B7925-15F2-FE46-8057-16C238D2A774}"/>
+                <a16:creationId xmlns="" xmlns:a16="http://schemas.microsoft.com/office/drawing/2014/main" id="{067B7925-15F2-FE46-8057-16C238D2A774}"/>
               </a:ext>
             </a:extLst>
           </p:cNvPr>
@@ -19061,7 +19083,7 @@
           <p:cNvPr id="3" name="Текст 2">
             <a:extLst>
               <a:ext uri="{FF2B5EF4-FFF2-40B4-BE49-F238E27FC236}">
-                <a16:creationId xmlns:a16="http://schemas.microsoft.com/office/drawing/2014/main" xmlns="" id="{C368357B-B74C-3F46-ABEA-915FE8D74C3F}"/>
+                <a16:creationId xmlns="" xmlns:a16="http://schemas.microsoft.com/office/drawing/2014/main" id="{C368357B-B74C-3F46-ABEA-915FE8D74C3F}"/>
               </a:ext>
             </a:extLst>
           </p:cNvPr>
@@ -19148,7 +19170,7 @@
           <p:cNvPr id="4" name="Текст 3">
             <a:extLst>
               <a:ext uri="{FF2B5EF4-FFF2-40B4-BE49-F238E27FC236}">
-                <a16:creationId xmlns:a16="http://schemas.microsoft.com/office/drawing/2014/main" xmlns="" id="{6731E9AF-89EB-BE48-AB15-FFA04594F61E}"/>
+                <a16:creationId xmlns="" xmlns:a16="http://schemas.microsoft.com/office/drawing/2014/main" id="{6731E9AF-89EB-BE48-AB15-FFA04594F61E}"/>
               </a:ext>
             </a:extLst>
           </p:cNvPr>
@@ -19191,7 +19213,7 @@
           <p:cNvPr id="6" name="Текст 5">
             <a:extLst>
               <a:ext uri="{FF2B5EF4-FFF2-40B4-BE49-F238E27FC236}">
-                <a16:creationId xmlns:a16="http://schemas.microsoft.com/office/drawing/2014/main" xmlns="" id="{B49CC8AE-0FE8-D44F-AB94-9FF99546E515}"/>
+                <a16:creationId xmlns="" xmlns:a16="http://schemas.microsoft.com/office/drawing/2014/main" id="{B49CC8AE-0FE8-D44F-AB94-9FF99546E515}"/>
               </a:ext>
             </a:extLst>
           </p:cNvPr>
@@ -19228,7 +19250,7 @@
           <p:cNvPr id="7" name="Текст 6">
             <a:extLst>
               <a:ext uri="{FF2B5EF4-FFF2-40B4-BE49-F238E27FC236}">
-                <a16:creationId xmlns:a16="http://schemas.microsoft.com/office/drawing/2014/main" xmlns="" id="{2B6044E3-0B71-0E47-8BB8-2E75FF51AEF7}"/>
+                <a16:creationId xmlns="" xmlns:a16="http://schemas.microsoft.com/office/drawing/2014/main" id="{2B6044E3-0B71-0E47-8BB8-2E75FF51AEF7}"/>
               </a:ext>
             </a:extLst>
           </p:cNvPr>
@@ -19276,7 +19298,7 @@
           <p:cNvPr id="8" name="Текст 7">
             <a:extLst>
               <a:ext uri="{FF2B5EF4-FFF2-40B4-BE49-F238E27FC236}">
-                <a16:creationId xmlns:a16="http://schemas.microsoft.com/office/drawing/2014/main" xmlns="" id="{5AE50B9E-D827-004A-9EE0-E68D4437BD90}"/>
+                <a16:creationId xmlns="" xmlns:a16="http://schemas.microsoft.com/office/drawing/2014/main" id="{5AE50B9E-D827-004A-9EE0-E68D4437BD90}"/>
               </a:ext>
             </a:extLst>
           </p:cNvPr>
@@ -19320,7 +19342,7 @@
           <p:cNvPr id="9" name="Chart 2">
             <a:extLst>
               <a:ext uri="{FF2B5EF4-FFF2-40B4-BE49-F238E27FC236}">
-                <a16:creationId xmlns:a16="http://schemas.microsoft.com/office/drawing/2014/main" xmlns="" id="{393AD814-0988-884E-93E6-AC16A440D0C4}"/>
+                <a16:creationId xmlns="" xmlns:a16="http://schemas.microsoft.com/office/drawing/2014/main" id="{393AD814-0988-884E-93E6-AC16A440D0C4}"/>
               </a:ext>
             </a:extLst>
           </p:cNvPr>
@@ -19348,7 +19370,7 @@
           <p:cNvPr id="11" name="Chart 1">
             <a:extLst>
               <a:ext uri="{FF2B5EF4-FFF2-40B4-BE49-F238E27FC236}">
-                <a16:creationId xmlns:a16="http://schemas.microsoft.com/office/drawing/2014/main" xmlns="" id="{14949F48-42A1-3A41-BECB-1BA0E21C291A}"/>
+                <a16:creationId xmlns="" xmlns:a16="http://schemas.microsoft.com/office/drawing/2014/main" id="{14949F48-42A1-3A41-BECB-1BA0E21C291A}"/>
               </a:ext>
             </a:extLst>
           </p:cNvPr>
@@ -19413,7 +19435,7 @@
           <p:cNvPr id="14" name="Заголовок 13">
             <a:extLst>
               <a:ext uri="{FF2B5EF4-FFF2-40B4-BE49-F238E27FC236}">
-                <a16:creationId xmlns:a16="http://schemas.microsoft.com/office/drawing/2014/main" xmlns="" id="{C1657578-5B49-FB42-9E68-EF4E3D607FF9}"/>
+                <a16:creationId xmlns="" xmlns:a16="http://schemas.microsoft.com/office/drawing/2014/main" id="{C1657578-5B49-FB42-9E68-EF4E3D607FF9}"/>
               </a:ext>
             </a:extLst>
           </p:cNvPr>
@@ -19455,7 +19477,7 @@
           <p:cNvPr id="16" name="Текст 15">
             <a:extLst>
               <a:ext uri="{FF2B5EF4-FFF2-40B4-BE49-F238E27FC236}">
-                <a16:creationId xmlns:a16="http://schemas.microsoft.com/office/drawing/2014/main" xmlns="" id="{50D06A58-9783-744B-8ED5-A490C825F5D6}"/>
+                <a16:creationId xmlns="" xmlns:a16="http://schemas.microsoft.com/office/drawing/2014/main" id="{50D06A58-9783-744B-8ED5-A490C825F5D6}"/>
               </a:ext>
             </a:extLst>
           </p:cNvPr>
@@ -19524,7 +19546,7 @@
           <p:cNvPr id="17" name="Текст 16">
             <a:extLst>
               <a:ext uri="{FF2B5EF4-FFF2-40B4-BE49-F238E27FC236}">
-                <a16:creationId xmlns:a16="http://schemas.microsoft.com/office/drawing/2014/main" xmlns="" id="{12BD20DF-BD74-4B4E-BFCB-0201711B214C}"/>
+                <a16:creationId xmlns="" xmlns:a16="http://schemas.microsoft.com/office/drawing/2014/main" id="{12BD20DF-BD74-4B4E-BFCB-0201711B214C}"/>
               </a:ext>
             </a:extLst>
           </p:cNvPr>
@@ -19561,7 +19583,7 @@
           <p:cNvPr id="18" name="Текст 17">
             <a:extLst>
               <a:ext uri="{FF2B5EF4-FFF2-40B4-BE49-F238E27FC236}">
-                <a16:creationId xmlns:a16="http://schemas.microsoft.com/office/drawing/2014/main" xmlns="" id="{AB20B420-8F92-714B-B774-4CCFF071FC96}"/>
+                <a16:creationId xmlns="" xmlns:a16="http://schemas.microsoft.com/office/drawing/2014/main" id="{AB20B420-8F92-714B-B774-4CCFF071FC96}"/>
               </a:ext>
             </a:extLst>
           </p:cNvPr>
@@ -19609,7 +19631,7 @@
           <p:cNvPr id="19" name="Текст 18">
             <a:extLst>
               <a:ext uri="{FF2B5EF4-FFF2-40B4-BE49-F238E27FC236}">
-                <a16:creationId xmlns:a16="http://schemas.microsoft.com/office/drawing/2014/main" xmlns="" id="{E28F3689-1426-FC44-97DB-4AC538FC64CC}"/>
+                <a16:creationId xmlns="" xmlns:a16="http://schemas.microsoft.com/office/drawing/2014/main" id="{E28F3689-1426-FC44-97DB-4AC538FC64CC}"/>
               </a:ext>
             </a:extLst>
           </p:cNvPr>
@@ -19783,7 +19805,7 @@
           <p:cNvPr id="5" name="Текст 4">
             <a:extLst>
               <a:ext uri="{FF2B5EF4-FFF2-40B4-BE49-F238E27FC236}">
-                <a16:creationId xmlns:a16="http://schemas.microsoft.com/office/drawing/2014/main" xmlns="" id="{B9589107-5631-554E-98CD-FD64EB1ACB71}"/>
+                <a16:creationId xmlns="" xmlns:a16="http://schemas.microsoft.com/office/drawing/2014/main" id="{B9589107-5631-554E-98CD-FD64EB1ACB71}"/>
               </a:ext>
             </a:extLst>
           </p:cNvPr>
@@ -19883,7 +19905,7 @@
           <p:cNvPr id="6" name="Текст 5">
             <a:extLst>
               <a:ext uri="{FF2B5EF4-FFF2-40B4-BE49-F238E27FC236}">
-                <a16:creationId xmlns:a16="http://schemas.microsoft.com/office/drawing/2014/main" xmlns="" id="{2467A1B8-16A4-134C-9B37-F388E503018D}"/>
+                <a16:creationId xmlns="" xmlns:a16="http://schemas.microsoft.com/office/drawing/2014/main" id="{2467A1B8-16A4-134C-9B37-F388E503018D}"/>
               </a:ext>
             </a:extLst>
           </p:cNvPr>
@@ -19920,7 +19942,7 @@
           <p:cNvPr id="7" name="Текст 6">
             <a:extLst>
               <a:ext uri="{FF2B5EF4-FFF2-40B4-BE49-F238E27FC236}">
-                <a16:creationId xmlns:a16="http://schemas.microsoft.com/office/drawing/2014/main" xmlns="" id="{8F16B6AC-7147-4143-8F71-EEB6F782C334}"/>
+                <a16:creationId xmlns="" xmlns:a16="http://schemas.microsoft.com/office/drawing/2014/main" id="{8F16B6AC-7147-4143-8F71-EEB6F782C334}"/>
               </a:ext>
             </a:extLst>
           </p:cNvPr>
@@ -19968,7 +19990,7 @@
           <p:cNvPr id="8" name="Текст 7">
             <a:extLst>
               <a:ext uri="{FF2B5EF4-FFF2-40B4-BE49-F238E27FC236}">
-                <a16:creationId xmlns:a16="http://schemas.microsoft.com/office/drawing/2014/main" xmlns="" id="{6C9C4F34-55DD-1B49-87D7-49B1EBF7F8EC}"/>
+                <a16:creationId xmlns="" xmlns:a16="http://schemas.microsoft.com/office/drawing/2014/main" id="{6C9C4F34-55DD-1B49-87D7-49B1EBF7F8EC}"/>
               </a:ext>
             </a:extLst>
           </p:cNvPr>
@@ -20007,7 +20029,7 @@
           <p:cNvPr id="10" name="Заголовок 13">
             <a:extLst>
               <a:ext uri="{FF2B5EF4-FFF2-40B4-BE49-F238E27FC236}">
-                <a16:creationId xmlns:a16="http://schemas.microsoft.com/office/drawing/2014/main" xmlns="" id="{C1657578-5B49-FB42-9E68-EF4E3D607FF9}"/>
+                <a16:creationId xmlns="" xmlns:a16="http://schemas.microsoft.com/office/drawing/2014/main" id="{C1657578-5B49-FB42-9E68-EF4E3D607FF9}"/>
               </a:ext>
             </a:extLst>
           </p:cNvPr>
@@ -20139,7 +20161,7 @@
           <p:cNvPr id="5" name="Текст 4">
             <a:extLst>
               <a:ext uri="{FF2B5EF4-FFF2-40B4-BE49-F238E27FC236}">
-                <a16:creationId xmlns:a16="http://schemas.microsoft.com/office/drawing/2014/main" xmlns="" id="{B9589107-5631-554E-98CD-FD64EB1ACB71}"/>
+                <a16:creationId xmlns="" xmlns:a16="http://schemas.microsoft.com/office/drawing/2014/main" id="{B9589107-5631-554E-98CD-FD64EB1ACB71}"/>
               </a:ext>
             </a:extLst>
           </p:cNvPr>
@@ -20205,7 +20227,7 @@
           <p:cNvPr id="6" name="Текст 5">
             <a:extLst>
               <a:ext uri="{FF2B5EF4-FFF2-40B4-BE49-F238E27FC236}">
-                <a16:creationId xmlns:a16="http://schemas.microsoft.com/office/drawing/2014/main" xmlns="" id="{2467A1B8-16A4-134C-9B37-F388E503018D}"/>
+                <a16:creationId xmlns="" xmlns:a16="http://schemas.microsoft.com/office/drawing/2014/main" id="{2467A1B8-16A4-134C-9B37-F388E503018D}"/>
               </a:ext>
             </a:extLst>
           </p:cNvPr>
@@ -20242,7 +20264,7 @@
           <p:cNvPr id="7" name="Текст 6">
             <a:extLst>
               <a:ext uri="{FF2B5EF4-FFF2-40B4-BE49-F238E27FC236}">
-                <a16:creationId xmlns:a16="http://schemas.microsoft.com/office/drawing/2014/main" xmlns="" id="{8F16B6AC-7147-4143-8F71-EEB6F782C334}"/>
+                <a16:creationId xmlns="" xmlns:a16="http://schemas.microsoft.com/office/drawing/2014/main" id="{8F16B6AC-7147-4143-8F71-EEB6F782C334}"/>
               </a:ext>
             </a:extLst>
           </p:cNvPr>
@@ -20290,7 +20312,7 @@
           <p:cNvPr id="8" name="Текст 7">
             <a:extLst>
               <a:ext uri="{FF2B5EF4-FFF2-40B4-BE49-F238E27FC236}">
-                <a16:creationId xmlns:a16="http://schemas.microsoft.com/office/drawing/2014/main" xmlns="" id="{6C9C4F34-55DD-1B49-87D7-49B1EBF7F8EC}"/>
+                <a16:creationId xmlns="" xmlns:a16="http://schemas.microsoft.com/office/drawing/2014/main" id="{6C9C4F34-55DD-1B49-87D7-49B1EBF7F8EC}"/>
               </a:ext>
             </a:extLst>
           </p:cNvPr>
@@ -20329,7 +20351,7 @@
           <p:cNvPr id="10" name="Заголовок 13">
             <a:extLst>
               <a:ext uri="{FF2B5EF4-FFF2-40B4-BE49-F238E27FC236}">
-                <a16:creationId xmlns:a16="http://schemas.microsoft.com/office/drawing/2014/main" xmlns="" id="{C1657578-5B49-FB42-9E68-EF4E3D607FF9}"/>
+                <a16:creationId xmlns="" xmlns:a16="http://schemas.microsoft.com/office/drawing/2014/main" id="{C1657578-5B49-FB42-9E68-EF4E3D607FF9}"/>
               </a:ext>
             </a:extLst>
           </p:cNvPr>
@@ -20395,47 +20417,60 @@
           </a:p>
         </p:txBody>
       </p:sp>
-      <p:sp>
-        <p:nvSpPr>
-          <p:cNvPr id="2" name="TextBox 1"/>
-          <p:cNvSpPr txBox="1"/>
+      <p:pic>
+        <p:nvPicPr>
+          <p:cNvPr id="1026" name="Picture 2"/>
+          <p:cNvPicPr>
+            <a:picLocks noChangeAspect="1" noChangeArrowheads="1"/>
+          </p:cNvPicPr>
           <p:nvPr/>
-        </p:nvSpPr>
-        <p:spPr>
+        </p:nvPicPr>
+        <p:blipFill>
+          <a:blip r:embed="rId2">
+            <a:extLst>
+              <a:ext uri="{28A0092B-C50C-407E-A947-70E740481C1C}">
+                <a14:useLocalDpi xmlns:a14="http://schemas.microsoft.com/office/drawing/2010/main" val="0"/>
+              </a:ext>
+            </a:extLst>
+          </a:blip>
+          <a:srcRect/>
+          <a:stretch>
+            <a:fillRect/>
+          </a:stretch>
+        </p:blipFill>
+        <p:spPr bwMode="auto">
           <a:xfrm>
-            <a:off x="4679205" y="2270234"/>
-            <a:ext cx="5785558" cy="1015663"/>
+            <a:off x="5328745" y="1327971"/>
+            <a:ext cx="5189782" cy="4541891"/>
           </a:xfrm>
           <a:prstGeom prst="rect">
             <a:avLst/>
           </a:prstGeom>
           <a:noFill/>
+          <a:ln>
+            <a:noFill/>
+          </a:ln>
+          <a:extLst>
+            <a:ext uri="{909E8E84-426E-40DD-AFC4-6F175D3DCCD1}">
+              <a14:hiddenFill xmlns:a14="http://schemas.microsoft.com/office/drawing/2010/main">
+                <a:solidFill>
+                  <a:schemeClr val="accent1"/>
+                </a:solidFill>
+              </a14:hiddenFill>
+            </a:ext>
+            <a:ext uri="{91240B29-F687-4F45-9708-019B960494DF}">
+              <a14:hiddenLine xmlns:a14="http://schemas.microsoft.com/office/drawing/2010/main" w="9525">
+                <a:solidFill>
+                  <a:schemeClr val="tx1"/>
+                </a:solidFill>
+                <a:miter lim="800000"/>
+                <a:headEnd/>
+                <a:tailEnd/>
+              </a14:hiddenLine>
+            </a:ext>
+          </a:extLst>
         </p:spPr>
-        <p:txBody>
-          <a:bodyPr wrap="none" rtlCol="0">
-            <a:spAutoFit/>
-          </a:bodyPr>
-          <a:lstStyle/>
-          <a:p>
-            <a:pPr algn="l"/>
-            <a:r>
-              <a:rPr lang="ru-RU" sz="6000" dirty="0" smtClean="0">
-                <a:solidFill>
-                  <a:srgbClr val="FF0000"/>
-                </a:solidFill>
-                <a:latin typeface="HSE Sans" panose="02000000000000000000" pitchFamily="2" charset="0"/>
-              </a:rPr>
-              <a:t>ДОБАВЬ СЮДА ВИДЕО</a:t>
-            </a:r>
-            <a:endParaRPr lang="ru-RU" sz="6000" dirty="0">
-              <a:solidFill>
-                <a:srgbClr val="FF0000"/>
-              </a:solidFill>
-              <a:latin typeface="HSE Sans" panose="02000000000000000000" pitchFamily="2" charset="0"/>
-            </a:endParaRPr>
-          </a:p>
-        </p:txBody>
-      </p:sp>
+      </p:pic>
     </p:spTree>
     <p:extLst>
       <p:ext uri="{BB962C8B-B14F-4D97-AF65-F5344CB8AC3E}">
@@ -20761,7 +20796,7 @@
   <a:extraClrSchemeLst/>
   <a:extLst>
     <a:ext uri="{05A4C25C-085E-4340-85A3-A5531E510DB2}">
-      <thm15:themeFamily xmlns:thm15="http://schemas.microsoft.com/office/thememl/2012/main" xmlns="" name="Office Theme" id="{62F939B6-93AF-4DB8-9C6B-D6C7DFDC589F}" vid="{4A3C46E8-61CC-4603-A589-7422A47A8E4A}"/>
+      <thm15:themeFamily xmlns="" xmlns:thm15="http://schemas.microsoft.com/office/thememl/2012/main" name="Office Theme" id="{62F939B6-93AF-4DB8-9C6B-D6C7DFDC589F}" vid="{4A3C46E8-61CC-4603-A589-7422A47A8E4A}"/>
     </a:ext>
   </a:extLst>
 </a:theme>
@@ -21056,28 +21091,13 @@
   <a:extraClrSchemeLst/>
   <a:extLst>
     <a:ext uri="{05A4C25C-085E-4340-85A3-A5531E510DB2}">
-      <thm15:themeFamily xmlns:thm15="http://schemas.microsoft.com/office/thememl/2012/main" xmlns="" name="Office Theme" id="{62F939B6-93AF-4DB8-9C6B-D6C7DFDC589F}" vid="{4A3C46E8-61CC-4603-A589-7422A47A8E4A}"/>
+      <thm15:themeFamily xmlns="" xmlns:thm15="http://schemas.microsoft.com/office/thememl/2012/main" name="Office Theme" id="{62F939B6-93AF-4DB8-9C6B-D6C7DFDC589F}" vid="{4A3C46E8-61CC-4603-A589-7422A47A8E4A}"/>
     </a:ext>
   </a:extLst>
 </a:theme>
 </file>
 
 <file path=customXml/item1.xml><?xml version="1.0" encoding="utf-8"?>
-<?mso-contentType ?>
-<FormTemplates xmlns="http://schemas.microsoft.com/sharepoint/v3/contenttype/forms">
-  <Display>DocumentLibraryForm</Display>
-  <Edit>DocumentLibraryForm</Edit>
-  <New>DocumentLibraryForm</New>
-</FormTemplates>
-</file>
-
-<file path=customXml/item2.xml><?xml version="1.0" encoding="utf-8"?>
-<p:properties xmlns:p="http://schemas.microsoft.com/office/2006/metadata/properties" xmlns:xsi="http://www.w3.org/2001/XMLSchema-instance" xmlns:pc="http://schemas.microsoft.com/office/infopath/2007/PartnerControls">
-  <documentManagement/>
-</p:properties>
-</file>
-
-<file path=customXml/item3.xml><?xml version="1.0" encoding="utf-8"?>
 <ct:contentTypeSchema xmlns:ct="http://schemas.microsoft.com/office/2006/metadata/contentType" xmlns:ma="http://schemas.microsoft.com/office/2006/metadata/properties/metaAttributes" ct:_="" ma:_="" ma:contentTypeName="Документ" ma:contentTypeID="0x0101002A9C74E6E830D74E9B0FDDB4017A5417" ma:contentTypeVersion="13" ma:contentTypeDescription="Создание документа." ma:contentTypeScope="" ma:versionID="d4e423622451d608a8a05f4da7a1e1a2">
   <xsd:schema xmlns:xsd="http://www.w3.org/2001/XMLSchema" xmlns:xs="http://www.w3.org/2001/XMLSchema" xmlns:p="http://schemas.microsoft.com/office/2006/metadata/properties" xmlns:ns2="9875bd71-cde8-496c-a136-433f55d5e6d0" xmlns:ns3="e96afe77-3acb-4328-97fc-408e1bde3ecd" targetNamespace="http://schemas.microsoft.com/office/2006/metadata/properties" ma:root="true" ma:fieldsID="4831203c63c08b9f52ea6d3ee0d7a96e" ns2:_="" ns3:_="">
     <xsd:import namespace="9875bd71-cde8-496c-a136-433f55d5e6d0"/>
@@ -21300,10 +21320,36 @@
 </ct:contentTypeSchema>
 </file>
 
+<file path=customXml/item2.xml><?xml version="1.0" encoding="utf-8"?>
+<p:properties xmlns:p="http://schemas.microsoft.com/office/2006/metadata/properties" xmlns:xsi="http://www.w3.org/2001/XMLSchema-instance" xmlns:pc="http://schemas.microsoft.com/office/infopath/2007/PartnerControls">
+  <documentManagement/>
+</p:properties>
+</file>
+
+<file path=customXml/item3.xml><?xml version="1.0" encoding="utf-8"?>
+<?mso-contentType ?>
+<FormTemplates xmlns="http://schemas.microsoft.com/sharepoint/v3/contenttype/forms">
+  <Display>DocumentLibraryForm</Display>
+  <Edit>DocumentLibraryForm</Edit>
+  <New>DocumentLibraryForm</New>
+</FormTemplates>
+</file>
+
 <file path=customXml/itemProps1.xml><?xml version="1.0" encoding="utf-8"?>
-<ds:datastoreItem xmlns:ds="http://schemas.openxmlformats.org/officeDocument/2006/customXml" ds:itemID="{B34386AA-1848-4C75-B336-1053927CB025}">
+<ds:datastoreItem xmlns:ds="http://schemas.openxmlformats.org/officeDocument/2006/customXml" ds:itemID="{4D4651DD-DCCC-4759-B2F6-7F520BDCC2B9}">
   <ds:schemaRefs>
-    <ds:schemaRef ds:uri="http://schemas.microsoft.com/sharepoint/v3/contenttype/forms"/>
+    <ds:schemaRef ds:uri="http://schemas.microsoft.com/office/2006/metadata/contentType"/>
+    <ds:schemaRef ds:uri="http://schemas.microsoft.com/office/2006/metadata/properties/metaAttributes"/>
+    <ds:schemaRef ds:uri="http://www.w3.org/2001/XMLSchema"/>
+    <ds:schemaRef ds:uri="http://schemas.microsoft.com/office/2006/metadata/properties"/>
+    <ds:schemaRef ds:uri="9875bd71-cde8-496c-a136-433f55d5e6d0"/>
+    <ds:schemaRef ds:uri="e96afe77-3acb-4328-97fc-408e1bde3ecd"/>
+    <ds:schemaRef ds:uri="http://schemas.microsoft.com/office/2006/documentManagement/types"/>
+    <ds:schemaRef ds:uri="http://schemas.microsoft.com/office/infopath/2007/PartnerControls"/>
+    <ds:schemaRef ds:uri="http://schemas.openxmlformats.org/package/2006/metadata/core-properties"/>
+    <ds:schemaRef ds:uri="http://purl.org/dc/elements/1.1/"/>
+    <ds:schemaRef ds:uri="http://purl.org/dc/terms/"/>
+    <ds:schemaRef ds:uri="http://schemas.microsoft.com/internal/obd"/>
   </ds:schemaRefs>
 </ds:datastoreItem>
 </file>
@@ -21326,20 +21372,9 @@
 </file>
 
 <file path=customXml/itemProps3.xml><?xml version="1.0" encoding="utf-8"?>
-<ds:datastoreItem xmlns:ds="http://schemas.openxmlformats.org/officeDocument/2006/customXml" ds:itemID="{4D4651DD-DCCC-4759-B2F6-7F520BDCC2B9}">
+<ds:datastoreItem xmlns:ds="http://schemas.openxmlformats.org/officeDocument/2006/customXml" ds:itemID="{B34386AA-1848-4C75-B336-1053927CB025}">
   <ds:schemaRefs>
-    <ds:schemaRef ds:uri="http://schemas.microsoft.com/office/2006/metadata/contentType"/>
-    <ds:schemaRef ds:uri="http://schemas.microsoft.com/office/2006/metadata/properties/metaAttributes"/>
-    <ds:schemaRef ds:uri="http://www.w3.org/2001/XMLSchema"/>
-    <ds:schemaRef ds:uri="http://schemas.microsoft.com/office/2006/metadata/properties"/>
-    <ds:schemaRef ds:uri="9875bd71-cde8-496c-a136-433f55d5e6d0"/>
-    <ds:schemaRef ds:uri="e96afe77-3acb-4328-97fc-408e1bde3ecd"/>
-    <ds:schemaRef ds:uri="http://schemas.microsoft.com/office/2006/documentManagement/types"/>
-    <ds:schemaRef ds:uri="http://schemas.microsoft.com/office/infopath/2007/PartnerControls"/>
-    <ds:schemaRef ds:uri="http://schemas.openxmlformats.org/package/2006/metadata/core-properties"/>
-    <ds:schemaRef ds:uri="http://purl.org/dc/elements/1.1/"/>
-    <ds:schemaRef ds:uri="http://purl.org/dc/terms/"/>
-    <ds:schemaRef ds:uri="http://schemas.microsoft.com/internal/obd"/>
+    <ds:schemaRef ds:uri="http://schemas.microsoft.com/sharepoint/v3/contenttype/forms"/>
   </ds:schemaRefs>
 </ds:datastoreItem>
 </file>
</xml_diff>